<commit_message>
updated presentation task_2 with the new version of checkDangerNote sequence diagram
</commit_message>
<xml_diff>
--- a/CaseStudies/CaseStudy2/doc/02-DomainModelAndSequenceDiagram/Task_2_Presentation.pptx
+++ b/CaseStudies/CaseStudy2/doc/02-DomainModelAndSequenceDiagram/Task_2_Presentation.pptx
@@ -144,7 +144,7 @@
   </p:defaultTextStyle>
   <p:extLst>
     <p:ext uri="{EFAFB233-063F-42B5-8137-9DF3F51BA10A}">
-      <p15:sldGuideLst xmlns:p15="http://schemas.microsoft.com/office/powerpoint/2012/main">
+      <p15:sldGuideLst xmlns:p15="http://schemas.microsoft.com/office/powerpoint/2012/main" xmlns="">
         <p15:guide id="1" orient="horz" pos="2160">
           <p15:clr>
             <a:srgbClr val="A4A3A4"/>
@@ -6955,25 +6955,6 @@
       </p:grpSpPr>
       <p:sp>
         <p:nvSpPr>
-          <p:cNvPr id="2" name="Inhaltsplatzhalter 1"/>
-          <p:cNvSpPr>
-            <a:spLocks noGrp="1"/>
-          </p:cNvSpPr>
-          <p:nvPr>
-            <p:ph sz="half" idx="1"/>
-          </p:nvPr>
-        </p:nvSpPr>
-        <p:spPr/>
-        <p:txBody>
-          <a:bodyPr/>
-          <a:lstStyle/>
-          <a:p>
-            <a:endParaRPr lang="de-CH" dirty="0"/>
-          </a:p>
-        </p:txBody>
-      </p:sp>
-      <p:sp>
-        <p:nvSpPr>
           <p:cNvPr id="3" name="Titel 2"/>
           <p:cNvSpPr>
             <a:spLocks noGrp="1"/>
@@ -7017,13 +6998,13 @@
       </p:sp>
       <p:pic>
         <p:nvPicPr>
-          <p:cNvPr id="2050" name="Picture 2" descr="checkDangerNotes.jpg"/>
+          <p:cNvPr id="4" name="Grafik 3"/>
           <p:cNvPicPr>
-            <a:picLocks noChangeAspect="1" noChangeArrowheads="1"/>
+            <a:picLocks noChangeAspect="1"/>
           </p:cNvPicPr>
           <p:nvPr/>
         </p:nvPicPr>
-        <p:blipFill>
+        <p:blipFill rotWithShape="1">
           <a:blip r:embed="rId2">
             <a:extLst>
               <a:ext uri="{28A0092B-C50C-407E-A947-70E740481C1C}">
@@ -7031,29 +7012,17 @@
               </a:ext>
             </a:extLst>
           </a:blip>
-          <a:srcRect/>
-          <a:stretch>
-            <a:fillRect/>
-          </a:stretch>
+          <a:srcRect t="12936" b="13931"/>
+          <a:stretch/>
         </p:blipFill>
-        <p:spPr bwMode="auto">
+        <p:spPr>
           <a:xfrm>
-            <a:off x="3142071" y="1332000"/>
-            <a:ext cx="5879282" cy="4788000"/>
+            <a:off x="2430873" y="900000"/>
+            <a:ext cx="7177587" cy="5249156"/>
           </a:xfrm>
           <a:prstGeom prst="rect">
             <a:avLst/>
           </a:prstGeom>
-          <a:noFill/>
-          <a:extLst>
-            <a:ext uri="{909E8E84-426E-40DD-AFC4-6F175D3DCCD1}">
-              <a14:hiddenFill xmlns:a14="http://schemas.microsoft.com/office/drawing/2010/main">
-                <a:solidFill>
-                  <a:srgbClr val="FFFFFF"/>
-                </a:solidFill>
-              </a14:hiddenFill>
-            </a:ext>
-          </a:extLst>
         </p:spPr>
       </p:pic>
     </p:spTree>
@@ -8201,19 +8170,12 @@
 </file>
 
 <file path=customXml/item1.xml><?xml version="1.0" encoding="utf-8"?>
-<p:properties xmlns:p="http://schemas.microsoft.com/office/2006/metadata/properties" xmlns:xsi="http://www.w3.org/2001/XMLSchema-instance" xmlns:pc="http://schemas.microsoft.com/office/infopath/2007/PartnerControls">
-  <documentManagement>
-    <QMPilot_DokID xmlns="2551ef7e-3b29-44d1-a8ad-ef34c26bfc60">470</QMPilot_DokID>
-    <BfhIntranetDepartmentText xmlns="f6f68f68-5570-446d-b1e6-2310e70d83d3">
-      <Terms xmlns="http://schemas.microsoft.com/office/infopath/2007/PartnerControls">
-        <TermInfo xmlns="http://schemas.microsoft.com/office/infopath/2007/PartnerControls">
-          <TermName xmlns="http://schemas.microsoft.com/office/infopath/2007/PartnerControls">Vorlage</TermName>
-          <TermId xmlns="http://schemas.microsoft.com/office/infopath/2007/PartnerControls">de1a6d3c-ac6a-4b34-8edd-308eb81066db</TermId>
-        </TermInfo>
-      </Terms>
-    </BfhIntranetDepartmentText>
-  </documentManagement>
-</p:properties>
+<?mso-contentType ?>
+<FormTemplates xmlns="http://schemas.microsoft.com/sharepoint/v3/contenttype/forms">
+  <Display>DocumentLibraryForm</Display>
+  <Edit>DocumentLibraryForm</Edit>
+  <New>DocumentLibraryForm</New>
+</FormTemplates>
 </file>
 
 <file path=customXml/item2.xml><?xml version="1.0" encoding="utf-8"?>
@@ -8356,21 +8318,25 @@
 </file>
 
 <file path=customXml/item3.xml><?xml version="1.0" encoding="utf-8"?>
-<?mso-contentType ?>
-<FormTemplates xmlns="http://schemas.microsoft.com/sharepoint/v3/contenttype/forms">
-  <Display>DocumentLibraryForm</Display>
-  <Edit>DocumentLibraryForm</Edit>
-  <New>DocumentLibraryForm</New>
-</FormTemplates>
+<p:properties xmlns:p="http://schemas.microsoft.com/office/2006/metadata/properties" xmlns:xsi="http://www.w3.org/2001/XMLSchema-instance" xmlns:pc="http://schemas.microsoft.com/office/infopath/2007/PartnerControls">
+  <documentManagement>
+    <QMPilot_DokID xmlns="2551ef7e-3b29-44d1-a8ad-ef34c26bfc60">470</QMPilot_DokID>
+    <BfhIntranetDepartmentText xmlns="f6f68f68-5570-446d-b1e6-2310e70d83d3">
+      <Terms xmlns="http://schemas.microsoft.com/office/infopath/2007/PartnerControls">
+        <TermInfo xmlns="http://schemas.microsoft.com/office/infopath/2007/PartnerControls">
+          <TermName xmlns="http://schemas.microsoft.com/office/infopath/2007/PartnerControls">Vorlage</TermName>
+          <TermId xmlns="http://schemas.microsoft.com/office/infopath/2007/PartnerControls">de1a6d3c-ac6a-4b34-8edd-308eb81066db</TermId>
+        </TermInfo>
+      </Terms>
+    </BfhIntranetDepartmentText>
+  </documentManagement>
+</p:properties>
 </file>
 
 <file path=customXml/itemProps1.xml><?xml version="1.0" encoding="utf-8"?>
-<ds:datastoreItem xmlns:ds="http://schemas.openxmlformats.org/officeDocument/2006/customXml" ds:itemID="{A0E21803-70F9-41A8-9C11-39A2457CDDF7}">
+<ds:datastoreItem xmlns:ds="http://schemas.openxmlformats.org/officeDocument/2006/customXml" ds:itemID="{9D47BE21-B709-4D16-ABB2-11D40677E528}">
   <ds:schemaRefs>
-    <ds:schemaRef ds:uri="http://schemas.microsoft.com/office/2006/metadata/properties"/>
-    <ds:schemaRef ds:uri="http://schemas.microsoft.com/office/infopath/2007/PartnerControls"/>
-    <ds:schemaRef ds:uri="2551ef7e-3b29-44d1-a8ad-ef34c26bfc60"/>
-    <ds:schemaRef ds:uri="f6f68f68-5570-446d-b1e6-2310e70d83d3"/>
+    <ds:schemaRef ds:uri="http://schemas.microsoft.com/sharepoint/v3/contenttype/forms"/>
   </ds:schemaRefs>
 </ds:datastoreItem>
 </file>
@@ -8395,9 +8361,12 @@
 </file>
 
 <file path=customXml/itemProps3.xml><?xml version="1.0" encoding="utf-8"?>
-<ds:datastoreItem xmlns:ds="http://schemas.openxmlformats.org/officeDocument/2006/customXml" ds:itemID="{9D47BE21-B709-4D16-ABB2-11D40677E528}">
+<ds:datastoreItem xmlns:ds="http://schemas.openxmlformats.org/officeDocument/2006/customXml" ds:itemID="{A0E21803-70F9-41A8-9C11-39A2457CDDF7}">
   <ds:schemaRefs>
-    <ds:schemaRef ds:uri="http://schemas.microsoft.com/sharepoint/v3/contenttype/forms"/>
+    <ds:schemaRef ds:uri="http://schemas.microsoft.com/office/2006/metadata/properties"/>
+    <ds:schemaRef ds:uri="http://schemas.microsoft.com/office/infopath/2007/PartnerControls"/>
+    <ds:schemaRef ds:uri="2551ef7e-3b29-44d1-a8ad-ef34c26bfc60"/>
+    <ds:schemaRef ds:uri="f6f68f68-5570-446d-b1e6-2310e70d83d3"/>
   </ds:schemaRefs>
 </ds:datastoreItem>
 </file>
</xml_diff>

<commit_message>
add my crc card to presentation
</commit_message>
<xml_diff>
--- a/CaseStudies/CaseStudy2/doc/02-DomainModelAndSequenceDiagram/Task_2_Presentation.pptx
+++ b/CaseStudies/CaseStudy2/doc/02-DomainModelAndSequenceDiagram/Task_2_Presentation.pptx
@@ -144,7 +144,7 @@
   </p:defaultTextStyle>
   <p:extLst>
     <p:ext uri="{EFAFB233-063F-42B5-8137-9DF3F51BA10A}">
-      <p15:sldGuideLst xmlns:p15="http://schemas.microsoft.com/office/powerpoint/2012/main" xmlns="">
+      <p15:sldGuideLst xmlns:p15="http://schemas.microsoft.com/office/powerpoint/2012/main">
         <p15:guide id="1" orient="horz" pos="2160">
           <p15:clr>
             <a:srgbClr val="A4A3A4"/>
@@ -252,7 +252,7 @@
               <a:pPr>
                 <a:defRPr/>
               </a:pPr>
-              <a:t>15.11.2017</a:t>
+              <a:t>16.11.17</a:t>
             </a:fld>
             <a:endParaRPr lang="de-CH" dirty="0"/>
           </a:p>
@@ -421,7 +421,7 @@
               <a:pPr>
                 <a:defRPr/>
               </a:pPr>
-              <a:t>‹Nr.›</a:t>
+              <a:t>‹#›</a:t>
             </a:fld>
             <a:endParaRPr lang="de-CH" dirty="0"/>
           </a:p>
@@ -1188,7 +1188,7 @@
               <a:pPr>
                 <a:defRPr/>
               </a:pPr>
-              <a:t>15.11.2017</a:t>
+              <a:t>16.11.17</a:t>
             </a:fld>
             <a:r>
               <a:rPr lang="de-DE" sz="1000" dirty="0"/>
@@ -1916,7 +1916,7 @@
               <a:pPr>
                 <a:defRPr/>
               </a:pPr>
-              <a:t>‹Nr.›</a:t>
+              <a:t>‹#›</a:t>
             </a:fld>
             <a:endParaRPr lang="de-CH" dirty="0"/>
           </a:p>
@@ -1979,7 +1979,7 @@
               <a:pPr>
                 <a:defRPr/>
               </a:pPr>
-              <a:t>‹Nr.›</a:t>
+              <a:t>‹#›</a:t>
             </a:fld>
             <a:endParaRPr lang="de-CH" dirty="0"/>
           </a:p>
@@ -2625,7 +2625,7 @@
               <a:pPr>
                 <a:defRPr/>
               </a:pPr>
-              <a:t>15.11.2017</a:t>
+              <a:t>16.11.17</a:t>
             </a:fld>
             <a:r>
               <a:rPr lang="de-DE" sz="1000" dirty="0"/>
@@ -3030,7 +3030,7 @@
               <a:pPr>
                 <a:defRPr/>
               </a:pPr>
-              <a:t>‹Nr.›</a:t>
+              <a:t>‹#›</a:t>
             </a:fld>
             <a:endParaRPr lang="de-CH" dirty="0"/>
           </a:p>
@@ -3429,7 +3429,7 @@
               <a:pPr>
                 <a:defRPr/>
               </a:pPr>
-              <a:t>‹Nr.›</a:t>
+              <a:t>‹#›</a:t>
             </a:fld>
             <a:endParaRPr lang="de-CH" dirty="0"/>
           </a:p>
@@ -3666,7 +3666,7 @@
               <a:pPr>
                 <a:defRPr/>
               </a:pPr>
-              <a:t>‹Nr.›</a:t>
+              <a:t>‹#›</a:t>
             </a:fld>
             <a:endParaRPr lang="de-CH" dirty="0"/>
           </a:p>
@@ -3977,7 +3977,7 @@
               <a:pPr>
                 <a:defRPr/>
               </a:pPr>
-              <a:t>‹Nr.›</a:t>
+              <a:t>‹#›</a:t>
             </a:fld>
             <a:endParaRPr lang="de-CH" dirty="0"/>
           </a:p>
@@ -4510,7 +4510,7 @@
               <a:pPr>
                 <a:defRPr/>
               </a:pPr>
-              <a:t>‹Nr.›</a:t>
+              <a:t>‹#›</a:t>
             </a:fld>
             <a:endParaRPr lang="de-CH" dirty="0"/>
           </a:p>
@@ -5043,7 +5043,7 @@
               <a:pPr>
                 <a:defRPr/>
               </a:pPr>
-              <a:t>‹Nr.›</a:t>
+              <a:t>‹#›</a:t>
             </a:fld>
             <a:endParaRPr lang="de-CH" dirty="0"/>
           </a:p>
@@ -5768,7 +5768,7 @@
               <a:pPr>
                 <a:defRPr/>
               </a:pPr>
-              <a:t>‹Nr.›</a:t>
+              <a:t>‹#›</a:t>
             </a:fld>
             <a:endParaRPr lang="de-CH" dirty="0"/>
           </a:p>
@@ -6074,7 +6074,7 @@
               <a:pPr>
                 <a:defRPr/>
               </a:pPr>
-              <a:t>‹Nr.›</a:t>
+              <a:t>‹#›</a:t>
             </a:fld>
             <a:endParaRPr lang="de-CH" dirty="0"/>
           </a:p>
@@ -7160,14 +7160,14 @@
             <p:ph sz="half" idx="1"/>
             <p:extLst>
               <p:ext uri="{D42A27DB-BD31-4B8C-83A1-F6EECF244321}">
-                <p14:modId xmlns:p14="http://schemas.microsoft.com/office/powerpoint/2010/main" val="2932627877"/>
+                <p14:modId xmlns:p14="http://schemas.microsoft.com/office/powerpoint/2010/main" val="2125420772"/>
               </p:ext>
             </p:extLst>
           </p:nvPr>
         </p:nvGraphicFramePr>
         <p:xfrm>
-          <a:off x="457200" y="1331913"/>
-          <a:ext cx="11249026" cy="4673600"/>
+          <a:off x="457199" y="1041456"/>
+          <a:ext cx="11249026" cy="5175523"/>
         </p:xfrm>
         <a:graphic>
           <a:graphicData uri="http://schemas.openxmlformats.org/drawingml/2006/table">
@@ -7179,15 +7179,23 @@
                 <a:gridCol w="5624513"/>
                 <a:gridCol w="5624513"/>
               </a:tblGrid>
-              <a:tr h="370840">
+              <a:tr h="323200">
                 <a:tc gridSpan="2">
                   <a:txBody>
                     <a:bodyPr/>
                     <a:lstStyle/>
                     <a:p>
                       <a:r>
-                        <a:rPr lang="de-CH" dirty="0" smtClean="0"/>
-                        <a:t>Class Name:</a:t>
+                        <a:rPr lang="de-CH" b="1" dirty="0" smtClean="0"/>
+                        <a:t>Class Name</a:t>
+                      </a:r>
+                      <a:r>
+                        <a:rPr lang="de-CH" b="1" dirty="0" smtClean="0"/>
+                        <a:t>: </a:t>
+                      </a:r>
+                      <a:r>
+                        <a:rPr lang="de-CH" dirty="0" err="1" smtClean="0"/>
+                        <a:t>DangerNote</a:t>
                       </a:r>
                       <a:endParaRPr lang="de-CH" dirty="0"/>
                     </a:p>
@@ -7205,19 +7213,119 @@
                   <a:tcPr/>
                 </a:tc>
               </a:tr>
-              <a:tr h="370840">
+              <a:tr h="323200">
                 <a:tc gridSpan="2">
                   <a:txBody>
                     <a:bodyPr/>
                     <a:lstStyle/>
                     <a:p>
                       <a:r>
+                        <a:rPr lang="de-CH" b="1" dirty="0" err="1" smtClean="0"/>
+                        <a:t>Purpose</a:t>
+                      </a:r>
+                      <a:r>
+                        <a:rPr lang="de-CH" b="1" dirty="0" smtClean="0"/>
+                        <a:t>: </a:t>
+                      </a:r>
+                      <a:r>
+                        <a:rPr lang="de-CH" dirty="0" smtClean="0"/>
+                        <a:t>A </a:t>
+                      </a:r>
+                      <a:r>
                         <a:rPr lang="de-CH" dirty="0" err="1" smtClean="0"/>
-                        <a:t>Purpose</a:t>
+                        <a:t>particular</a:t>
                       </a:r>
                       <a:r>
                         <a:rPr lang="de-CH" dirty="0" smtClean="0"/>
-                        <a:t>:</a:t>
+                        <a:t> </a:t>
+                      </a:r>
+                      <a:r>
+                        <a:rPr lang="de-CH" dirty="0" err="1" smtClean="0"/>
+                        <a:t>note</a:t>
+                      </a:r>
+                      <a:r>
+                        <a:rPr lang="de-CH" dirty="0" smtClean="0"/>
+                        <a:t> </a:t>
+                      </a:r>
+                      <a:r>
+                        <a:rPr lang="de-CH" dirty="0" err="1" smtClean="0"/>
+                        <a:t>containing</a:t>
+                      </a:r>
+                      <a:r>
+                        <a:rPr lang="de-CH" dirty="0" smtClean="0"/>
+                        <a:t> </a:t>
+                      </a:r>
+                      <a:r>
+                        <a:rPr lang="de-CH" dirty="0" err="1" smtClean="0"/>
+                        <a:t>text</a:t>
+                      </a:r>
+                      <a:r>
+                        <a:rPr lang="de-CH" dirty="0" smtClean="0"/>
+                        <a:t> </a:t>
+                      </a:r>
+                      <a:r>
+                        <a:rPr lang="de-CH" dirty="0" err="1" smtClean="0"/>
+                        <a:t>data</a:t>
+                      </a:r>
+                      <a:r>
+                        <a:rPr lang="de-CH" dirty="0" smtClean="0"/>
+                        <a:t> </a:t>
+                      </a:r>
+                      <a:r>
+                        <a:rPr lang="de-CH" dirty="0" err="1" smtClean="0"/>
+                        <a:t>to</a:t>
+                      </a:r>
+                      <a:r>
+                        <a:rPr lang="de-CH" dirty="0" smtClean="0"/>
+                        <a:t> </a:t>
+                      </a:r>
+                      <a:r>
+                        <a:rPr lang="de-CH" dirty="0" err="1" smtClean="0"/>
+                        <a:t>describe</a:t>
+                      </a:r>
+                      <a:r>
+                        <a:rPr lang="de-CH" dirty="0" smtClean="0"/>
+                        <a:t> a </a:t>
+                      </a:r>
+                      <a:r>
+                        <a:rPr lang="de-CH" dirty="0" err="1" smtClean="0"/>
+                        <a:t>dangerous</a:t>
+                      </a:r>
+                      <a:r>
+                        <a:rPr lang="de-CH" dirty="0" smtClean="0"/>
+                        <a:t> </a:t>
+                      </a:r>
+                      <a:r>
+                        <a:rPr lang="de-CH" dirty="0" err="1" smtClean="0"/>
+                        <a:t>fact</a:t>
+                      </a:r>
+                      <a:r>
+                        <a:rPr lang="de-CH" dirty="0" smtClean="0"/>
+                        <a:t> </a:t>
+                      </a:r>
+                      <a:r>
+                        <a:rPr lang="de-CH" dirty="0" err="1" smtClean="0"/>
+                        <a:t>related</a:t>
+                      </a:r>
+                      <a:r>
+                        <a:rPr lang="de-CH" dirty="0" smtClean="0"/>
+                        <a:t> </a:t>
+                      </a:r>
+                      <a:r>
+                        <a:rPr lang="de-CH" dirty="0" err="1" smtClean="0"/>
+                        <a:t>to</a:t>
+                      </a:r>
+                      <a:r>
+                        <a:rPr lang="de-CH" dirty="0" smtClean="0"/>
+                        <a:t> a </a:t>
+                      </a:r>
+                      <a:r>
+                        <a:rPr lang="de-CH" dirty="0" err="1" smtClean="0"/>
+                        <a:t>patient</a:t>
+                      </a:r>
+                      <a:r>
+                        <a:rPr lang="de-CH" dirty="0" smtClean="0"/>
+                        <a:t>.</a:t>
                       </a:r>
                       <a:endParaRPr lang="de-CH" dirty="0"/>
                     </a:p>
@@ -7235,18 +7343,18 @@
                   <a:tcPr/>
                 </a:tc>
               </a:tr>
-              <a:tr h="370840">
+              <a:tr h="4444003">
                 <a:tc>
                   <a:txBody>
                     <a:bodyPr/>
                     <a:lstStyle/>
                     <a:p>
                       <a:r>
-                        <a:rPr lang="de-CH" dirty="0" err="1" smtClean="0"/>
+                        <a:rPr lang="de-CH" b="1" dirty="0" err="1" smtClean="0"/>
                         <a:t>Responsibilities</a:t>
                       </a:r>
                       <a:r>
-                        <a:rPr lang="de-CH" dirty="0" smtClean="0"/>
+                        <a:rPr lang="de-CH" b="1" dirty="0" smtClean="0"/>
                         <a:t>:</a:t>
                       </a:r>
                     </a:p>
@@ -7254,21 +7362,179 @@
                       <a:endParaRPr lang="de-CH" dirty="0" smtClean="0"/>
                     </a:p>
                     <a:p>
-                      <a:endParaRPr lang="de-CH" dirty="0" smtClean="0"/>
+                      <a:r>
+                        <a:rPr lang="de-CH" dirty="0" smtClean="0"/>
+                        <a:t>- </a:t>
+                      </a:r>
+                      <a:r>
+                        <a:rPr lang="de-CH" dirty="0" err="1" smtClean="0"/>
+                        <a:t>Contains</a:t>
+                      </a:r>
+                      <a:r>
+                        <a:rPr lang="de-CH" dirty="0" smtClean="0"/>
+                        <a:t> a </a:t>
+                      </a:r>
+                      <a:r>
+                        <a:rPr lang="de-CH" dirty="0" err="1" smtClean="0"/>
+                        <a:t>text</a:t>
+                      </a:r>
+                      <a:r>
+                        <a:rPr lang="de-CH" dirty="0" smtClean="0"/>
+                        <a:t> </a:t>
+                      </a:r>
+                      <a:r>
+                        <a:rPr lang="de-CH" dirty="0" err="1" smtClean="0"/>
+                        <a:t>which</a:t>
+                      </a:r>
+                      <a:r>
+                        <a:rPr lang="de-CH" dirty="0" smtClean="0"/>
+                        <a:t> </a:t>
+                      </a:r>
+                      <a:r>
+                        <a:rPr lang="de-CH" dirty="0" err="1" smtClean="0"/>
+                        <a:t>is</a:t>
+                      </a:r>
+                      <a:r>
+                        <a:rPr lang="de-CH" dirty="0" smtClean="0"/>
+                        <a:t> </a:t>
+                      </a:r>
+                      <a:r>
+                        <a:rPr lang="de-CH" dirty="0" err="1" smtClean="0"/>
+                        <a:t>attached</a:t>
+                      </a:r>
+                      <a:r>
+                        <a:rPr lang="de-CH" dirty="0" smtClean="0"/>
+                        <a:t> </a:t>
+                      </a:r>
+                      <a:r>
+                        <a:rPr lang="de-CH" dirty="0" err="1" smtClean="0"/>
+                        <a:t>to</a:t>
+                      </a:r>
+                      <a:r>
+                        <a:rPr lang="de-CH" dirty="0" smtClean="0"/>
+                        <a:t> </a:t>
+                      </a:r>
+                      <a:r>
+                        <a:rPr lang="de-CH" dirty="0" err="1" smtClean="0"/>
+                        <a:t>specific</a:t>
+                      </a:r>
+                      <a:r>
+                        <a:rPr lang="de-CH" dirty="0" smtClean="0"/>
+                        <a:t> </a:t>
+                      </a:r>
+                      <a:r>
+                        <a:rPr lang="de-CH" dirty="0" err="1" smtClean="0"/>
+                        <a:t>patient</a:t>
+                      </a:r>
+                      <a:r>
+                        <a:rPr lang="de-CH" dirty="0" smtClean="0"/>
+                        <a:t>.  </a:t>
+                      </a:r>
                     </a:p>
                     <a:p>
                       <a:endParaRPr lang="de-CH" dirty="0" smtClean="0"/>
                     </a:p>
                     <a:p>
-                      <a:endParaRPr lang="de-CH" dirty="0" smtClean="0"/>
-                    </a:p>
-                    <a:p>
-                      <a:endParaRPr lang="de-CH" dirty="0" smtClean="0"/>
-                    </a:p>
-                    <a:p>
-                      <a:endParaRPr lang="de-CH" dirty="0" smtClean="0"/>
-                    </a:p>
-                    <a:p>
+                      <a:r>
+                        <a:rPr lang="de-CH" dirty="0" smtClean="0"/>
+                        <a:t>- </a:t>
+                      </a:r>
+                      <a:r>
+                        <a:rPr lang="de-CH" dirty="0" err="1" smtClean="0"/>
+                        <a:t>Indicates</a:t>
+                      </a:r>
+                      <a:r>
+                        <a:rPr lang="de-CH" dirty="0" smtClean="0"/>
+                        <a:t> a </a:t>
+                      </a:r>
+                      <a:r>
+                        <a:rPr lang="de-CH" dirty="0" err="1" smtClean="0"/>
+                        <a:t>fact</a:t>
+                      </a:r>
+                      <a:r>
+                        <a:rPr lang="de-CH" dirty="0" smtClean="0"/>
+                        <a:t> </a:t>
+                      </a:r>
+                      <a:r>
+                        <a:rPr lang="de-CH" dirty="0" err="1" smtClean="0"/>
+                        <a:t>about</a:t>
+                      </a:r>
+                      <a:r>
+                        <a:rPr lang="de-CH" dirty="0" smtClean="0"/>
+                        <a:t> / </a:t>
+                      </a:r>
+                      <a:r>
+                        <a:rPr lang="de-CH" dirty="0" err="1" smtClean="0"/>
+                        <a:t>correlated</a:t>
+                      </a:r>
+                      <a:r>
+                        <a:rPr lang="de-CH" dirty="0" smtClean="0"/>
+                        <a:t> </a:t>
+                      </a:r>
+                      <a:r>
+                        <a:rPr lang="de-CH" dirty="0" err="1" smtClean="0"/>
+                        <a:t>to</a:t>
+                      </a:r>
+                      <a:r>
+                        <a:rPr lang="de-CH" dirty="0" smtClean="0"/>
+                        <a:t> a </a:t>
+                      </a:r>
+                      <a:r>
+                        <a:rPr lang="de-CH" dirty="0" err="1" smtClean="0"/>
+                        <a:t>patient</a:t>
+                      </a:r>
+                      <a:r>
+                        <a:rPr lang="de-CH" dirty="0" smtClean="0"/>
+                        <a:t> </a:t>
+                      </a:r>
+                      <a:r>
+                        <a:rPr lang="de-CH" dirty="0" err="1" smtClean="0"/>
+                        <a:t>which</a:t>
+                      </a:r>
+                      <a:r>
+                        <a:rPr lang="de-CH" dirty="0" smtClean="0"/>
+                        <a:t> </a:t>
+                      </a:r>
+                      <a:r>
+                        <a:rPr lang="de-CH" dirty="0" err="1" smtClean="0"/>
+                        <a:t>is</a:t>
+                      </a:r>
+                      <a:r>
+                        <a:rPr lang="de-CH" dirty="0" smtClean="0"/>
+                        <a:t> </a:t>
+                      </a:r>
+                      <a:r>
+                        <a:rPr lang="de-CH" dirty="0" err="1" smtClean="0"/>
+                        <a:t>or</a:t>
+                      </a:r>
+                      <a:r>
+                        <a:rPr lang="de-CH" dirty="0" smtClean="0"/>
+                        <a:t> </a:t>
+                      </a:r>
+                      <a:r>
+                        <a:rPr lang="de-CH" dirty="0" err="1" smtClean="0"/>
+                        <a:t>could</a:t>
+                      </a:r>
+                      <a:r>
+                        <a:rPr lang="de-CH" dirty="0" smtClean="0"/>
+                        <a:t> </a:t>
+                      </a:r>
+                      <a:r>
+                        <a:rPr lang="de-CH" dirty="0" err="1" smtClean="0"/>
+                        <a:t>be</a:t>
+                      </a:r>
+                      <a:r>
+                        <a:rPr lang="de-CH" dirty="0" smtClean="0"/>
+                        <a:t> </a:t>
+                      </a:r>
+                      <a:r>
+                        <a:rPr lang="de-CH" dirty="0" err="1" smtClean="0"/>
+                        <a:t>dangerous</a:t>
+                      </a:r>
+                      <a:r>
+                        <a:rPr lang="de-CH" dirty="0" smtClean="0"/>
+                        <a:t> </a:t>
+                      </a:r>
                       <a:endParaRPr lang="de-CH" dirty="0" smtClean="0"/>
                     </a:p>
                     <a:p>
@@ -7298,14 +7564,76 @@
                     <a:lstStyle/>
                     <a:p>
                       <a:r>
-                        <a:rPr lang="de-CH" dirty="0" err="1" smtClean="0"/>
+                        <a:rPr lang="de-CH" b="1" dirty="0" err="1" smtClean="0"/>
                         <a:t>Collaborators</a:t>
                       </a:r>
                       <a:r>
-                        <a:rPr lang="de-CH" dirty="0" smtClean="0"/>
+                        <a:rPr lang="de-CH" b="1" dirty="0" smtClean="0"/>
                         <a:t>:</a:t>
                       </a:r>
-                      <a:endParaRPr lang="de-CH" dirty="0"/>
+                    </a:p>
+                    <a:p>
+                      <a:endParaRPr lang="de-CH" b="1" dirty="0" smtClean="0"/>
+                    </a:p>
+                    <a:p>
+                      <a:r>
+                        <a:rPr lang="de-CH" b="0" dirty="0" smtClean="0"/>
+                        <a:t>-</a:t>
+                      </a:r>
+                      <a:r>
+                        <a:rPr lang="de-CH" b="0" baseline="0" dirty="0" smtClean="0"/>
+                        <a:t> </a:t>
+                      </a:r>
+                      <a:r>
+                        <a:rPr lang="de-CH" b="0" dirty="0" err="1" smtClean="0"/>
+                        <a:t>belongs</a:t>
+                      </a:r>
+                      <a:r>
+                        <a:rPr lang="de-CH" b="0" dirty="0" smtClean="0"/>
+                        <a:t> </a:t>
+                      </a:r>
+                      <a:r>
+                        <a:rPr lang="de-CH" b="0" dirty="0" err="1" smtClean="0"/>
+                        <a:t>to</a:t>
+                      </a:r>
+                      <a:r>
+                        <a:rPr lang="de-CH" b="0" dirty="0" smtClean="0"/>
+                        <a:t> a </a:t>
+                      </a:r>
+                      <a:r>
+                        <a:rPr lang="de-CH" b="0" dirty="0" err="1" smtClean="0"/>
+                        <a:t>patient</a:t>
+                      </a:r>
+                      <a:r>
+                        <a:rPr lang="de-CH" b="0" dirty="0" smtClean="0"/>
+                        <a:t>  </a:t>
+                      </a:r>
+                    </a:p>
+                    <a:p>
+                      <a:pPr marL="285750" indent="-285750">
+                        <a:buFontTx/>
+                        <a:buChar char="-"/>
+                      </a:pPr>
+                      <a:endParaRPr lang="de-CH" b="0" dirty="0" smtClean="0"/>
+                    </a:p>
+                    <a:p>
+                      <a:r>
+                        <a:rPr lang="de-CH" b="0" dirty="0" smtClean="0"/>
+                        <a:t>- </a:t>
+                      </a:r>
+                      <a:r>
+                        <a:rPr lang="de-CH" b="0" dirty="0" err="1" smtClean="0"/>
+                        <a:t>extends</a:t>
+                      </a:r>
+                      <a:r>
+                        <a:rPr lang="de-CH" b="0" dirty="0" smtClean="0"/>
+                        <a:t> a normal </a:t>
+                      </a:r>
+                      <a:r>
+                        <a:rPr lang="de-CH" b="0" dirty="0" err="1" smtClean="0"/>
+                        <a:t>note</a:t>
+                      </a:r>
+                      <a:endParaRPr lang="de-CH" b="0" dirty="0"/>
                     </a:p>
                   </a:txBody>
                   <a:tcPr/>
@@ -7332,7 +7660,15 @@
           <a:p>
             <a:r>
               <a:rPr lang="de-CH" dirty="0" smtClean="0"/>
-              <a:t>CRC Card</a:t>
+              <a:t>CRC </a:t>
+            </a:r>
+            <a:r>
+              <a:rPr lang="de-CH" dirty="0" smtClean="0"/>
+              <a:t>Card - </a:t>
+            </a:r>
+            <a:r>
+              <a:rPr lang="de-CH" dirty="0" err="1" smtClean="0"/>
+              <a:t>DangerNote</a:t>
             </a:r>
             <a:endParaRPr lang="de-CH" dirty="0"/>
           </a:p>
@@ -7368,19 +7704,47 @@
           <a:chExt cx="0" cy="0"/>
         </a:xfrm>
       </p:grpSpPr>
+      <p:sp>
+        <p:nvSpPr>
+          <p:cNvPr id="3" name="Titel 2"/>
+          <p:cNvSpPr>
+            <a:spLocks noGrp="1"/>
+          </p:cNvSpPr>
+          <p:nvPr>
+            <p:ph type="ctrTitle"/>
+          </p:nvPr>
+        </p:nvSpPr>
+        <p:spPr/>
+        <p:txBody>
+          <a:bodyPr/>
+          <a:lstStyle/>
+          <a:p>
+            <a:r>
+              <a:rPr lang="de-CH" dirty="0" smtClean="0"/>
+              <a:t>CRC Card</a:t>
+            </a:r>
+            <a:endParaRPr lang="de-CH" dirty="0"/>
+          </a:p>
+        </p:txBody>
+      </p:sp>
       <p:graphicFrame>
         <p:nvGraphicFramePr>
-          <p:cNvPr id="5" name="Inhaltsplatzhalter 4"/>
+          <p:cNvPr id="7" name="Inhaltsplatzhalter 4"/>
           <p:cNvGraphicFramePr>
             <a:graphicFrameLocks noGrp="1"/>
           </p:cNvGraphicFramePr>
           <p:nvPr>
             <p:ph sz="half" idx="1"/>
+            <p:extLst>
+              <p:ext uri="{D42A27DB-BD31-4B8C-83A1-F6EECF244321}">
+                <p14:modId xmlns:p14="http://schemas.microsoft.com/office/powerpoint/2010/main" val="147978104"/>
+              </p:ext>
+            </p:extLst>
           </p:nvPr>
         </p:nvGraphicFramePr>
         <p:xfrm>
-          <a:off x="457200" y="1331913"/>
-          <a:ext cx="11249026" cy="4673600"/>
+          <a:off x="457199" y="1041456"/>
+          <a:ext cx="11249026" cy="5175523"/>
         </p:xfrm>
         <a:graphic>
           <a:graphicData uri="http://schemas.openxmlformats.org/drawingml/2006/table">
@@ -7392,15 +7756,19 @@
                 <a:gridCol w="5624513"/>
                 <a:gridCol w="5624513"/>
               </a:tblGrid>
-              <a:tr h="370840">
+              <a:tr h="323200">
                 <a:tc gridSpan="2">
                   <a:txBody>
                     <a:bodyPr/>
                     <a:lstStyle/>
                     <a:p>
                       <a:r>
-                        <a:rPr lang="de-CH" dirty="0" smtClean="0"/>
-                        <a:t>Class Name:</a:t>
+                        <a:rPr lang="de-CH" b="1" dirty="0" smtClean="0"/>
+                        <a:t>Class Name</a:t>
+                      </a:r>
+                      <a:r>
+                        <a:rPr lang="de-CH" b="1" dirty="0" smtClean="0"/>
+                        <a:t>:</a:t>
                       </a:r>
                       <a:endParaRPr lang="de-CH" dirty="0"/>
                     </a:p>
@@ -7418,18 +7786,18 @@
                   <a:tcPr/>
                 </a:tc>
               </a:tr>
-              <a:tr h="370840">
+              <a:tr h="323200">
                 <a:tc gridSpan="2">
                   <a:txBody>
                     <a:bodyPr/>
                     <a:lstStyle/>
                     <a:p>
                       <a:r>
-                        <a:rPr lang="de-CH" dirty="0" err="1" smtClean="0"/>
+                        <a:rPr lang="de-CH" b="1" dirty="0" err="1" smtClean="0"/>
                         <a:t>Purpose</a:t>
                       </a:r>
                       <a:r>
-                        <a:rPr lang="de-CH" dirty="0" smtClean="0"/>
+                        <a:rPr lang="de-CH" b="1" dirty="0" smtClean="0"/>
                         <a:t>:</a:t>
                       </a:r>
                       <a:endParaRPr lang="de-CH" dirty="0"/>
@@ -7448,38 +7816,20 @@
                   <a:tcPr/>
                 </a:tc>
               </a:tr>
-              <a:tr h="370840">
+              <a:tr h="4444003">
                 <a:tc>
                   <a:txBody>
                     <a:bodyPr/>
                     <a:lstStyle/>
                     <a:p>
                       <a:r>
-                        <a:rPr lang="de-CH" dirty="0" err="1" smtClean="0"/>
+                        <a:rPr lang="de-CH" b="1" dirty="0" err="1" smtClean="0"/>
                         <a:t>Responsibilities</a:t>
                       </a:r>
                       <a:r>
-                        <a:rPr lang="de-CH" dirty="0" smtClean="0"/>
+                        <a:rPr lang="de-CH" b="1" dirty="0" smtClean="0"/>
                         <a:t>:</a:t>
                       </a:r>
-                    </a:p>
-                    <a:p>
-                      <a:endParaRPr lang="de-CH" dirty="0" smtClean="0"/>
-                    </a:p>
-                    <a:p>
-                      <a:endParaRPr lang="de-CH" dirty="0" smtClean="0"/>
-                    </a:p>
-                    <a:p>
-                      <a:endParaRPr lang="de-CH" dirty="0" smtClean="0"/>
-                    </a:p>
-                    <a:p>
-                      <a:endParaRPr lang="de-CH" dirty="0" smtClean="0"/>
-                    </a:p>
-                    <a:p>
-                      <a:endParaRPr lang="de-CH" dirty="0" smtClean="0"/>
-                    </a:p>
-                    <a:p>
-                      <a:endParaRPr lang="de-CH" dirty="0" smtClean="0"/>
                     </a:p>
                     <a:p>
                       <a:endParaRPr lang="de-CH" dirty="0" smtClean="0"/>
@@ -7511,14 +7861,16 @@
                     <a:lstStyle/>
                     <a:p>
                       <a:r>
-                        <a:rPr lang="de-CH" dirty="0" err="1" smtClean="0"/>
+                        <a:rPr lang="de-CH" b="1" dirty="0" err="1" smtClean="0"/>
                         <a:t>Collaborators</a:t>
                       </a:r>
                       <a:r>
-                        <a:rPr lang="de-CH" dirty="0" smtClean="0"/>
+                        <a:rPr lang="de-CH" b="1" dirty="0" smtClean="0"/>
                         <a:t>:</a:t>
                       </a:r>
-                      <a:endParaRPr lang="de-CH" dirty="0"/>
+                    </a:p>
+                    <a:p>
+                      <a:endParaRPr lang="de-CH" b="1" dirty="0" smtClean="0"/>
                     </a:p>
                   </a:txBody>
                   <a:tcPr/>
@@ -7528,29 +7880,6 @@
           </a:graphicData>
         </a:graphic>
       </p:graphicFrame>
-      <p:sp>
-        <p:nvSpPr>
-          <p:cNvPr id="3" name="Titel 2"/>
-          <p:cNvSpPr>
-            <a:spLocks noGrp="1"/>
-          </p:cNvSpPr>
-          <p:nvPr>
-            <p:ph type="ctrTitle"/>
-          </p:nvPr>
-        </p:nvSpPr>
-        <p:spPr/>
-        <p:txBody>
-          <a:bodyPr/>
-          <a:lstStyle/>
-          <a:p>
-            <a:r>
-              <a:rPr lang="de-CH" dirty="0" smtClean="0"/>
-              <a:t>CRC Card</a:t>
-            </a:r>
-            <a:endParaRPr lang="de-CH" dirty="0"/>
-          </a:p>
-        </p:txBody>
-      </p:sp>
     </p:spTree>
     <p:extLst>
       <p:ext uri="{BB962C8B-B14F-4D97-AF65-F5344CB8AC3E}">

</xml_diff>

<commit_message>
update crc cards & presentation
</commit_message>
<xml_diff>
--- a/CaseStudies/CaseStudy2/doc/02-DomainModelAndSequenceDiagram/Task_2_Presentation.pptx
+++ b/CaseStudies/CaseStudy2/doc/02-DomainModelAndSequenceDiagram/Task_2_Presentation.pptx
@@ -7160,7 +7160,7 @@
             <p:ph sz="half" idx="1"/>
             <p:extLst>
               <p:ext uri="{D42A27DB-BD31-4B8C-83A1-F6EECF244321}">
-                <p14:modId xmlns:p14="http://schemas.microsoft.com/office/powerpoint/2010/main" val="2125420772"/>
+                <p14:modId xmlns:p14="http://schemas.microsoft.com/office/powerpoint/2010/main" val="989332769"/>
               </p:ext>
             </p:extLst>
           </p:nvPr>
@@ -7187,11 +7187,7 @@
                     <a:p>
                       <a:r>
                         <a:rPr lang="de-CH" b="1" dirty="0" smtClean="0"/>
-                        <a:t>Class Name</a:t>
-                      </a:r>
-                      <a:r>
-                        <a:rPr lang="de-CH" b="1" dirty="0" smtClean="0"/>
-                        <a:t>: </a:t>
+                        <a:t>Class Name: </a:t>
                       </a:r>
                       <a:r>
                         <a:rPr lang="de-CH" dirty="0" err="1" smtClean="0"/>
@@ -7372,7 +7368,15 @@
                       </a:r>
                       <a:r>
                         <a:rPr lang="de-CH" dirty="0" smtClean="0"/>
-                        <a:t> a </a:t>
+                        <a:t> a title (</a:t>
+                      </a:r>
+                      <a:r>
+                        <a:rPr lang="de-CH" i="1" dirty="0" smtClean="0"/>
+                        <a:t>title</a:t>
+                      </a:r>
+                      <a:r>
+                        <a:rPr lang="de-CH" dirty="0" smtClean="0"/>
+                        <a:t>), </a:t>
                       </a:r>
                       <a:r>
                         <a:rPr lang="de-CH" dirty="0" err="1" smtClean="0"/>
@@ -7380,7 +7384,15 @@
                       </a:r>
                       <a:r>
                         <a:rPr lang="de-CH" dirty="0" smtClean="0"/>
-                        <a:t> </a:t>
+                        <a:t> (</a:t>
+                      </a:r>
+                      <a:r>
+                        <a:rPr lang="de-CH" i="1" dirty="0" err="1" smtClean="0"/>
+                        <a:t>text</a:t>
+                      </a:r>
+                      <a:r>
+                        <a:rPr lang="de-CH" dirty="0" smtClean="0"/>
+                        <a:t>) </a:t>
                       </a:r>
                       <a:r>
                         <a:rPr lang="de-CH" dirty="0" err="1" smtClean="0"/>
@@ -7428,8 +7440,17 @@
                       </a:r>
                       <a:r>
                         <a:rPr lang="de-CH" dirty="0" smtClean="0"/>
-                        <a:t>.  </a:t>
-                      </a:r>
+                        <a:t> (</a:t>
+                      </a:r>
+                      <a:r>
+                        <a:rPr lang="de-CH" i="1" dirty="0" err="1" smtClean="0"/>
+                        <a:t>patientId</a:t>
+                      </a:r>
+                      <a:r>
+                        <a:rPr lang="de-CH" dirty="0" smtClean="0"/>
+                        <a:t>).</a:t>
+                      </a:r>
+                      <a:endParaRPr lang="de-CH" dirty="0" smtClean="0"/>
                     </a:p>
                     <a:p>
                       <a:endParaRPr lang="de-CH" dirty="0" smtClean="0"/>
@@ -7535,7 +7556,6 @@
                         <a:rPr lang="de-CH" dirty="0" smtClean="0"/>
                         <a:t> </a:t>
                       </a:r>
-                      <a:endParaRPr lang="de-CH" dirty="0" smtClean="0"/>
                     </a:p>
                     <a:p>
                       <a:endParaRPr lang="de-CH" dirty="0" smtClean="0"/>
@@ -7660,11 +7680,7 @@
           <a:p>
             <a:r>
               <a:rPr lang="de-CH" dirty="0" smtClean="0"/>
-              <a:t>CRC </a:t>
-            </a:r>
-            <a:r>
-              <a:rPr lang="de-CH" dirty="0" smtClean="0"/>
-              <a:t>Card - </a:t>
+              <a:t>CRC Card - </a:t>
             </a:r>
             <a:r>
               <a:rPr lang="de-CH" dirty="0" err="1" smtClean="0"/>
@@ -7764,11 +7780,7 @@
                     <a:p>
                       <a:r>
                         <a:rPr lang="de-CH" b="1" dirty="0" smtClean="0"/>
-                        <a:t>Class Name</a:t>
-                      </a:r>
-                      <a:r>
-                        <a:rPr lang="de-CH" b="1" dirty="0" smtClean="0"/>
-                        <a:t>:</a:t>
+                        <a:t>Class Name:</a:t>
                       </a:r>
                       <a:endParaRPr lang="de-CH" dirty="0"/>
                     </a:p>

</xml_diff>

<commit_message>
update presentation with michis and mänus changes
</commit_message>
<xml_diff>
--- a/CaseStudies/CaseStudy2/doc/02-DomainModelAndSequenceDiagram/Task_2_Presentation.pptx
+++ b/CaseStudies/CaseStudy2/doc/02-DomainModelAndSequenceDiagram/Task_2_Presentation.pptx
@@ -5,15 +5,17 @@
     <p:sldMasterId id="2147483669" r:id="rId4"/>
   </p:sldMasterIdLst>
   <p:notesMasterIdLst>
-    <p:notesMasterId r:id="rId11"/>
+    <p:notesMasterId r:id="rId13"/>
   </p:notesMasterIdLst>
   <p:sldIdLst>
     <p:sldId id="256" r:id="rId5"/>
     <p:sldId id="257" r:id="rId6"/>
     <p:sldId id="258" r:id="rId7"/>
     <p:sldId id="259" r:id="rId8"/>
-    <p:sldId id="261" r:id="rId9"/>
-    <p:sldId id="262" r:id="rId10"/>
+    <p:sldId id="264" r:id="rId9"/>
+    <p:sldId id="261" r:id="rId10"/>
+    <p:sldId id="265" r:id="rId11"/>
+    <p:sldId id="266" r:id="rId12"/>
   </p:sldIdLst>
   <p:sldSz cx="12207875" cy="6858000"/>
   <p:notesSz cx="6797675" cy="9872663"/>
@@ -7120,6 +7122,47 @@
           </a:p>
         </p:txBody>
       </p:sp>
+      <p:pic>
+        <p:nvPicPr>
+          <p:cNvPr id="1026" name="Picture 2" descr="sequenceDiagrammUpdate.jpg"/>
+          <p:cNvPicPr>
+            <a:picLocks noChangeAspect="1" noChangeArrowheads="1"/>
+          </p:cNvPicPr>
+          <p:nvPr/>
+        </p:nvPicPr>
+        <p:blipFill>
+          <a:blip r:embed="rId2">
+            <a:extLst>
+              <a:ext uri="{28A0092B-C50C-407E-A947-70E740481C1C}">
+                <a14:useLocalDpi xmlns:a14="http://schemas.microsoft.com/office/drawing/2010/main" val="0"/>
+              </a:ext>
+            </a:extLst>
+          </a:blip>
+          <a:srcRect/>
+          <a:stretch>
+            <a:fillRect/>
+          </a:stretch>
+        </p:blipFill>
+        <p:spPr bwMode="auto">
+          <a:xfrm>
+            <a:off x="2889449" y="1232380"/>
+            <a:ext cx="6384526" cy="4987239"/>
+          </a:xfrm>
+          <a:prstGeom prst="rect">
+            <a:avLst/>
+          </a:prstGeom>
+          <a:noFill/>
+          <a:extLst>
+            <a:ext uri="{909E8E84-426E-40DD-AFC4-6F175D3DCCD1}">
+              <a14:hiddenFill xmlns:a14="http://schemas.microsoft.com/office/drawing/2010/main">
+                <a:solidFill>
+                  <a:srgbClr val="FFFFFF"/>
+                </a:solidFill>
+              </a14:hiddenFill>
+            </a:ext>
+          </a:extLst>
+        </p:spPr>
+      </p:pic>
     </p:spTree>
     <p:extLst>
       <p:ext uri="{BB962C8B-B14F-4D97-AF65-F5344CB8AC3E}">
@@ -7160,14 +7203,14 @@
             <p:ph sz="half" idx="1"/>
             <p:extLst>
               <p:ext uri="{D42A27DB-BD31-4B8C-83A1-F6EECF244321}">
-                <p14:modId xmlns:p14="http://schemas.microsoft.com/office/powerpoint/2010/main" val="989332769"/>
+                <p14:modId xmlns:p14="http://schemas.microsoft.com/office/powerpoint/2010/main" val="2096106828"/>
               </p:ext>
             </p:extLst>
           </p:nvPr>
         </p:nvGraphicFramePr>
         <p:xfrm>
-          <a:off x="457199" y="1041456"/>
-          <a:ext cx="11249026" cy="5175523"/>
+          <a:off x="644297" y="1449670"/>
+          <a:ext cx="10874830" cy="3931297"/>
         </p:xfrm>
         <a:graphic>
           <a:graphicData uri="http://schemas.openxmlformats.org/drawingml/2006/table">
@@ -7176,10 +7219,10 @@
                 <a:tableStyleId>{5940675A-B579-460E-94D1-54222C63F5DA}</a:tableStyleId>
               </a:tblPr>
               <a:tblGrid>
-                <a:gridCol w="5624513"/>
-                <a:gridCol w="5624513"/>
+                <a:gridCol w="5437415"/>
+                <a:gridCol w="5437415"/>
               </a:tblGrid>
-              <a:tr h="323200">
+              <a:tr h="263355">
                 <a:tc gridSpan="2">
                   <a:txBody>
                     <a:bodyPr/>
@@ -7209,7 +7252,7 @@
                   <a:tcPr/>
                 </a:tc>
               </a:tr>
-              <a:tr h="323200">
+              <a:tr h="263355">
                 <a:tc gridSpan="2">
                   <a:txBody>
                     <a:bodyPr/>
@@ -7339,7 +7382,7 @@
                   <a:tcPr/>
                 </a:tc>
               </a:tr>
-              <a:tr h="4444003">
+              <a:tr h="3199777">
                 <a:tc>
                   <a:txBody>
                     <a:bodyPr/>
@@ -7355,138 +7398,55 @@
                       </a:r>
                     </a:p>
                     <a:p>
-                      <a:endParaRPr lang="de-CH" dirty="0" smtClean="0"/>
-                    </a:p>
-                    <a:p>
-                      <a:r>
-                        <a:rPr lang="de-CH" dirty="0" smtClean="0"/>
-                        <a:t>- </a:t>
-                      </a:r>
-                      <a:r>
-                        <a:rPr lang="de-CH" dirty="0" err="1" smtClean="0"/>
-                        <a:t>Contains</a:t>
-                      </a:r>
-                      <a:r>
-                        <a:rPr lang="de-CH" dirty="0" smtClean="0"/>
-                        <a:t> a title (</a:t>
-                      </a:r>
-                      <a:r>
-                        <a:rPr lang="de-CH" i="1" dirty="0" smtClean="0"/>
-                        <a:t>title</a:t>
-                      </a:r>
-                      <a:r>
-                        <a:rPr lang="de-CH" dirty="0" smtClean="0"/>
-                        <a:t>), </a:t>
-                      </a:r>
-                      <a:r>
-                        <a:rPr lang="de-CH" dirty="0" err="1" smtClean="0"/>
-                        <a:t>text</a:t>
-                      </a:r>
-                      <a:r>
-                        <a:rPr lang="de-CH" dirty="0" smtClean="0"/>
-                        <a:t> (</a:t>
-                      </a:r>
-                      <a:r>
-                        <a:rPr lang="de-CH" i="1" dirty="0" err="1" smtClean="0"/>
-                        <a:t>text</a:t>
-                      </a:r>
-                      <a:r>
-                        <a:rPr lang="de-CH" dirty="0" smtClean="0"/>
-                        <a:t>) </a:t>
-                      </a:r>
-                      <a:r>
-                        <a:rPr lang="de-CH" dirty="0" err="1" smtClean="0"/>
-                        <a:t>which</a:t>
-                      </a:r>
-                      <a:r>
-                        <a:rPr lang="de-CH" dirty="0" smtClean="0"/>
-                        <a:t> </a:t>
-                      </a:r>
-                      <a:r>
-                        <a:rPr lang="de-CH" dirty="0" err="1" smtClean="0"/>
-                        <a:t>is</a:t>
-                      </a:r>
-                      <a:r>
-                        <a:rPr lang="de-CH" dirty="0" smtClean="0"/>
-                        <a:t> </a:t>
-                      </a:r>
-                      <a:r>
-                        <a:rPr lang="de-CH" dirty="0" err="1" smtClean="0"/>
-                        <a:t>attached</a:t>
-                      </a:r>
-                      <a:r>
-                        <a:rPr lang="de-CH" dirty="0" smtClean="0"/>
-                        <a:t> </a:t>
-                      </a:r>
-                      <a:r>
-                        <a:rPr lang="de-CH" dirty="0" err="1" smtClean="0"/>
-                        <a:t>to</a:t>
-                      </a:r>
-                      <a:r>
-                        <a:rPr lang="de-CH" dirty="0" smtClean="0"/>
-                        <a:t> </a:t>
-                      </a:r>
-                      <a:r>
-                        <a:rPr lang="de-CH" dirty="0" err="1" smtClean="0"/>
-                        <a:t>specific</a:t>
-                      </a:r>
-                      <a:r>
-                        <a:rPr lang="de-CH" dirty="0" smtClean="0"/>
-                        <a:t> </a:t>
-                      </a:r>
-                      <a:r>
-                        <a:rPr lang="de-CH" dirty="0" err="1" smtClean="0"/>
-                        <a:t>patient</a:t>
-                      </a:r>
-                      <a:r>
-                        <a:rPr lang="de-CH" dirty="0" smtClean="0"/>
-                        <a:t> (</a:t>
-                      </a:r>
-                      <a:r>
-                        <a:rPr lang="de-CH" i="1" dirty="0" err="1" smtClean="0"/>
-                        <a:t>patientId</a:t>
-                      </a:r>
-                      <a:r>
-                        <a:rPr lang="de-CH" dirty="0" smtClean="0"/>
-                        <a:t>).</a:t>
-                      </a:r>
-                      <a:endParaRPr lang="de-CH" dirty="0" smtClean="0"/>
+                      <a:endParaRPr lang="de-CH" b="1" dirty="0" smtClean="0"/>
                     </a:p>
                     <a:p>
                       <a:endParaRPr lang="de-CH" dirty="0" smtClean="0"/>
                     </a:p>
                     <a:p>
-                      <a:r>
-                        <a:rPr lang="de-CH" dirty="0" smtClean="0"/>
-                        <a:t>- </a:t>
-                      </a:r>
+                      <a:pPr marL="285750" indent="-285750">
+                        <a:buFont typeface="Arial" charset="0"/>
+                        <a:buChar char="•"/>
+                      </a:pPr>
                       <a:r>
                         <a:rPr lang="de-CH" dirty="0" err="1" smtClean="0"/>
-                        <a:t>Indicates</a:t>
-                      </a:r>
-                      <a:r>
-                        <a:rPr lang="de-CH" dirty="0" smtClean="0"/>
-                        <a:t> a </a:t>
-                      </a:r>
-                      <a:r>
-                        <a:rPr lang="de-CH" dirty="0" err="1" smtClean="0"/>
-                        <a:t>fact</a:t>
+                        <a:t>contains</a:t>
                       </a:r>
                       <a:r>
                         <a:rPr lang="de-CH" dirty="0" smtClean="0"/>
                         <a:t> </a:t>
                       </a:r>
                       <a:r>
+                        <a:rPr lang="de-CH" dirty="0" smtClean="0"/>
+                        <a:t>a title (</a:t>
+                      </a:r>
+                      <a:r>
+                        <a:rPr lang="de-CH" i="1" dirty="0" smtClean="0"/>
+                        <a:t>title</a:t>
+                      </a:r>
+                      <a:r>
+                        <a:rPr lang="de-CH" dirty="0" smtClean="0"/>
+                        <a:t>), </a:t>
+                      </a:r>
+                      <a:r>
                         <a:rPr lang="de-CH" dirty="0" err="1" smtClean="0"/>
-                        <a:t>about</a:t>
+                        <a:t>text</a:t>
                       </a:r>
                       <a:r>
                         <a:rPr lang="de-CH" dirty="0" smtClean="0"/>
-                        <a:t> / </a:t>
+                        <a:t> (</a:t>
+                      </a:r>
+                      <a:r>
+                        <a:rPr lang="de-CH" i="1" dirty="0" err="1" smtClean="0"/>
+                        <a:t>text</a:t>
+                      </a:r>
+                      <a:r>
+                        <a:rPr lang="de-CH" dirty="0" smtClean="0"/>
+                        <a:t>) </a:t>
                       </a:r>
                       <a:r>
                         <a:rPr lang="de-CH" dirty="0" err="1" smtClean="0"/>
-                        <a:t>correlated</a:t>
+                        <a:t>which</a:t>
                       </a:r>
                       <a:r>
                         <a:rPr lang="de-CH" dirty="0" smtClean="0"/>
@@ -7494,11 +7454,35 @@
                       </a:r>
                       <a:r>
                         <a:rPr lang="de-CH" dirty="0" err="1" smtClean="0"/>
+                        <a:t>is</a:t>
+                      </a:r>
+                      <a:r>
+                        <a:rPr lang="de-CH" dirty="0" smtClean="0"/>
+                        <a:t> </a:t>
+                      </a:r>
+                      <a:r>
+                        <a:rPr lang="de-CH" dirty="0" err="1" smtClean="0"/>
+                        <a:t>attached</a:t>
+                      </a:r>
+                      <a:r>
+                        <a:rPr lang="de-CH" dirty="0" smtClean="0"/>
+                        <a:t> </a:t>
+                      </a:r>
+                      <a:r>
+                        <a:rPr lang="de-CH" dirty="0" err="1" smtClean="0"/>
                         <a:t>to</a:t>
                       </a:r>
                       <a:r>
                         <a:rPr lang="de-CH" dirty="0" smtClean="0"/>
-                        <a:t> a </a:t>
+                        <a:t> </a:t>
+                      </a:r>
+                      <a:r>
+                        <a:rPr lang="de-CH" dirty="0" err="1" smtClean="0"/>
+                        <a:t>specific</a:t>
+                      </a:r>
+                      <a:r>
+                        <a:rPr lang="de-CH" dirty="0" smtClean="0"/>
+                        <a:t> </a:t>
                       </a:r>
                       <a:r>
                         <a:rPr lang="de-CH" dirty="0" err="1" smtClean="0"/>
@@ -7506,74 +7490,125 @@
                       </a:r>
                       <a:r>
                         <a:rPr lang="de-CH" dirty="0" smtClean="0"/>
-                        <a:t> </a:t>
-                      </a:r>
-                      <a:r>
-                        <a:rPr lang="de-CH" dirty="0" err="1" smtClean="0"/>
-                        <a:t>which</a:t>
+                        <a:t> (</a:t>
+                      </a:r>
+                      <a:r>
+                        <a:rPr lang="de-CH" i="1" dirty="0" err="1" smtClean="0"/>
+                        <a:t>patientId</a:t>
                       </a:r>
                       <a:r>
                         <a:rPr lang="de-CH" dirty="0" smtClean="0"/>
-                        <a:t> </a:t>
-                      </a:r>
-                      <a:r>
-                        <a:rPr lang="de-CH" dirty="0" err="1" smtClean="0"/>
-                        <a:t>is</a:t>
-                      </a:r>
-                      <a:r>
-                        <a:rPr lang="de-CH" dirty="0" smtClean="0"/>
-                        <a:t> </a:t>
-                      </a:r>
-                      <a:r>
-                        <a:rPr lang="de-CH" dirty="0" err="1" smtClean="0"/>
-                        <a:t>or</a:t>
-                      </a:r>
-                      <a:r>
-                        <a:rPr lang="de-CH" dirty="0" smtClean="0"/>
-                        <a:t> </a:t>
-                      </a:r>
-                      <a:r>
-                        <a:rPr lang="de-CH" dirty="0" err="1" smtClean="0"/>
-                        <a:t>could</a:t>
-                      </a:r>
-                      <a:r>
-                        <a:rPr lang="de-CH" dirty="0" smtClean="0"/>
-                        <a:t> </a:t>
-                      </a:r>
-                      <a:r>
-                        <a:rPr lang="de-CH" dirty="0" err="1" smtClean="0"/>
-                        <a:t>be</a:t>
-                      </a:r>
-                      <a:r>
-                        <a:rPr lang="de-CH" dirty="0" smtClean="0"/>
-                        <a:t> </a:t>
-                      </a:r>
-                      <a:r>
-                        <a:rPr lang="de-CH" dirty="0" err="1" smtClean="0"/>
-                        <a:t>dangerous</a:t>
-                      </a:r>
-                      <a:r>
-                        <a:rPr lang="de-CH" dirty="0" smtClean="0"/>
-                        <a:t> </a:t>
+                        <a:t>).</a:t>
                       </a:r>
                     </a:p>
                     <a:p>
                       <a:endParaRPr lang="de-CH" dirty="0" smtClean="0"/>
                     </a:p>
                     <a:p>
-                      <a:endParaRPr lang="de-CH" dirty="0" smtClean="0"/>
-                    </a:p>
-                    <a:p>
-                      <a:endParaRPr lang="de-CH" dirty="0" smtClean="0"/>
-                    </a:p>
-                    <a:p>
-                      <a:endParaRPr lang="de-CH" dirty="0" smtClean="0"/>
-                    </a:p>
-                    <a:p>
-                      <a:endParaRPr lang="de-CH" dirty="0" smtClean="0"/>
-                    </a:p>
-                    <a:p>
-                      <a:endParaRPr lang="de-CH" dirty="0" smtClean="0"/>
+                      <a:pPr marL="285750" indent="-285750">
+                        <a:buFont typeface="Arial" charset="0"/>
+                        <a:buChar char="•"/>
+                      </a:pPr>
+                      <a:r>
+                        <a:rPr lang="de-CH" dirty="0" err="1" smtClean="0"/>
+                        <a:t>indicates</a:t>
+                      </a:r>
+                      <a:r>
+                        <a:rPr lang="de-CH" dirty="0" smtClean="0"/>
+                        <a:t> </a:t>
+                      </a:r>
+                      <a:r>
+                        <a:rPr lang="de-CH" dirty="0" smtClean="0"/>
+                        <a:t>a </a:t>
+                      </a:r>
+                      <a:r>
+                        <a:rPr lang="de-CH" dirty="0" err="1" smtClean="0"/>
+                        <a:t>fact</a:t>
+                      </a:r>
+                      <a:r>
+                        <a:rPr lang="de-CH" dirty="0" smtClean="0"/>
+                        <a:t> </a:t>
+                      </a:r>
+                      <a:r>
+                        <a:rPr lang="de-CH" dirty="0" err="1" smtClean="0"/>
+                        <a:t>about</a:t>
+                      </a:r>
+                      <a:r>
+                        <a:rPr lang="de-CH" dirty="0" smtClean="0"/>
+                        <a:t> / </a:t>
+                      </a:r>
+                      <a:r>
+                        <a:rPr lang="de-CH" dirty="0" err="1" smtClean="0"/>
+                        <a:t>correlated</a:t>
+                      </a:r>
+                      <a:r>
+                        <a:rPr lang="de-CH" dirty="0" smtClean="0"/>
+                        <a:t> </a:t>
+                      </a:r>
+                      <a:r>
+                        <a:rPr lang="de-CH" dirty="0" err="1" smtClean="0"/>
+                        <a:t>to</a:t>
+                      </a:r>
+                      <a:r>
+                        <a:rPr lang="de-CH" dirty="0" smtClean="0"/>
+                        <a:t> a </a:t>
+                      </a:r>
+                      <a:r>
+                        <a:rPr lang="de-CH" dirty="0" err="1" smtClean="0"/>
+                        <a:t>patient</a:t>
+                      </a:r>
+                      <a:r>
+                        <a:rPr lang="de-CH" dirty="0" smtClean="0"/>
+                        <a:t> </a:t>
+                      </a:r>
+                      <a:r>
+                        <a:rPr lang="de-CH" dirty="0" err="1" smtClean="0"/>
+                        <a:t>which</a:t>
+                      </a:r>
+                      <a:r>
+                        <a:rPr lang="de-CH" dirty="0" smtClean="0"/>
+                        <a:t> </a:t>
+                      </a:r>
+                      <a:r>
+                        <a:rPr lang="de-CH" dirty="0" err="1" smtClean="0"/>
+                        <a:t>is</a:t>
+                      </a:r>
+                      <a:r>
+                        <a:rPr lang="de-CH" dirty="0" smtClean="0"/>
+                        <a:t> </a:t>
+                      </a:r>
+                      <a:r>
+                        <a:rPr lang="de-CH" dirty="0" err="1" smtClean="0"/>
+                        <a:t>or</a:t>
+                      </a:r>
+                      <a:r>
+                        <a:rPr lang="de-CH" dirty="0" smtClean="0"/>
+                        <a:t> </a:t>
+                      </a:r>
+                      <a:r>
+                        <a:rPr lang="de-CH" dirty="0" err="1" smtClean="0"/>
+                        <a:t>could</a:t>
+                      </a:r>
+                      <a:r>
+                        <a:rPr lang="de-CH" dirty="0" smtClean="0"/>
+                        <a:t> </a:t>
+                      </a:r>
+                      <a:r>
+                        <a:rPr lang="de-CH" dirty="0" err="1" smtClean="0"/>
+                        <a:t>be</a:t>
+                      </a:r>
+                      <a:r>
+                        <a:rPr lang="de-CH" dirty="0" smtClean="0"/>
+                        <a:t> </a:t>
+                      </a:r>
+                      <a:r>
+                        <a:rPr lang="de-CH" dirty="0" err="1" smtClean="0"/>
+                        <a:t>dangerous</a:t>
+                      </a:r>
+                      <a:r>
+                        <a:rPr lang="de-CH" dirty="0" smtClean="0"/>
+                        <a:t> </a:t>
+                      </a:r>
                     </a:p>
                   </a:txBody>
                   <a:tcPr/>
@@ -7596,14 +7631,13 @@
                       <a:endParaRPr lang="de-CH" b="1" dirty="0" smtClean="0"/>
                     </a:p>
                     <a:p>
-                      <a:r>
-                        <a:rPr lang="de-CH" b="0" dirty="0" smtClean="0"/>
-                        <a:t>-</a:t>
-                      </a:r>
-                      <a:r>
-                        <a:rPr lang="de-CH" b="0" baseline="0" dirty="0" smtClean="0"/>
-                        <a:t> </a:t>
-                      </a:r>
+                      <a:endParaRPr lang="de-CH" b="1" dirty="0" smtClean="0"/>
+                    </a:p>
+                    <a:p>
+                      <a:pPr marL="285750" indent="-285750">
+                        <a:buFont typeface="Arial" charset="0"/>
+                        <a:buChar char="•"/>
+                      </a:pPr>
                       <a:r>
                         <a:rPr lang="de-CH" b="0" dirty="0" err="1" smtClean="0"/>
                         <a:t>belongs</a:t>
@@ -7637,17 +7671,21 @@
                       <a:endParaRPr lang="de-CH" b="0" dirty="0" smtClean="0"/>
                     </a:p>
                     <a:p>
-                      <a:r>
-                        <a:rPr lang="de-CH" b="0" dirty="0" smtClean="0"/>
-                        <a:t>- </a:t>
-                      </a:r>
+                      <a:pPr marL="285750" indent="-285750">
+                        <a:buFont typeface="Arial" charset="0"/>
+                        <a:buChar char="•"/>
+                      </a:pPr>
                       <a:r>
                         <a:rPr lang="de-CH" b="0" dirty="0" err="1" smtClean="0"/>
                         <a:t>extends</a:t>
                       </a:r>
                       <a:r>
                         <a:rPr lang="de-CH" b="0" dirty="0" smtClean="0"/>
-                        <a:t> a normal </a:t>
+                        <a:t> </a:t>
+                      </a:r>
+                      <a:r>
+                        <a:rPr lang="de-CH" b="0" dirty="0" smtClean="0"/>
+                        <a:t>a normal </a:t>
                       </a:r>
                       <a:r>
                         <a:rPr lang="de-CH" b="0" dirty="0" err="1" smtClean="0"/>
@@ -7693,7 +7731,7 @@
     </p:spTree>
     <p:extLst>
       <p:ext uri="{BB962C8B-B14F-4D97-AF65-F5344CB8AC3E}">
-        <p14:creationId xmlns:p14="http://schemas.microsoft.com/office/powerpoint/2010/main" val="1465781760"/>
+        <p14:creationId xmlns:p14="http://schemas.microsoft.com/office/powerpoint/2010/main" val="1736500707"/>
       </p:ext>
     </p:extLst>
   </p:cSld>
@@ -7720,32 +7758,9 @@
           <a:chExt cx="0" cy="0"/>
         </a:xfrm>
       </p:grpSpPr>
-      <p:sp>
-        <p:nvSpPr>
-          <p:cNvPr id="3" name="Titel 2"/>
-          <p:cNvSpPr>
-            <a:spLocks noGrp="1"/>
-          </p:cNvSpPr>
-          <p:nvPr>
-            <p:ph type="ctrTitle"/>
-          </p:nvPr>
-        </p:nvSpPr>
-        <p:spPr/>
-        <p:txBody>
-          <a:bodyPr/>
-          <a:lstStyle/>
-          <a:p>
-            <a:r>
-              <a:rPr lang="de-CH" dirty="0" smtClean="0"/>
-              <a:t>CRC Card</a:t>
-            </a:r>
-            <a:endParaRPr lang="de-CH" dirty="0"/>
-          </a:p>
-        </p:txBody>
-      </p:sp>
       <p:graphicFrame>
         <p:nvGraphicFramePr>
-          <p:cNvPr id="7" name="Inhaltsplatzhalter 4"/>
+          <p:cNvPr id="5" name="Inhaltsplatzhalter 4"/>
           <p:cNvGraphicFramePr>
             <a:graphicFrameLocks noGrp="1"/>
           </p:cNvGraphicFramePr>
@@ -7753,14 +7768,14 @@
             <p:ph sz="half" idx="1"/>
             <p:extLst>
               <p:ext uri="{D42A27DB-BD31-4B8C-83A1-F6EECF244321}">
-                <p14:modId xmlns:p14="http://schemas.microsoft.com/office/powerpoint/2010/main" val="147978104"/>
+                <p14:modId xmlns:p14="http://schemas.microsoft.com/office/powerpoint/2010/main" val="1416842763"/>
               </p:ext>
             </p:extLst>
           </p:nvPr>
         </p:nvGraphicFramePr>
         <p:xfrm>
-          <a:off x="457199" y="1041456"/>
-          <a:ext cx="11249026" cy="5175523"/>
+          <a:off x="457200" y="1331913"/>
+          <a:ext cx="11249026" cy="4673600"/>
         </p:xfrm>
         <a:graphic>
           <a:graphicData uri="http://schemas.openxmlformats.org/drawingml/2006/table">
@@ -7772,7 +7787,7 @@
                 <a:gridCol w="5624513"/>
                 <a:gridCol w="5624513"/>
               </a:tblGrid>
-              <a:tr h="323200">
+              <a:tr h="370840">
                 <a:tc gridSpan="2">
                   <a:txBody>
                     <a:bodyPr/>
@@ -7781,6 +7796,14 @@
                       <a:r>
                         <a:rPr lang="de-CH" b="1" dirty="0" smtClean="0"/>
                         <a:t>Class Name:</a:t>
+                      </a:r>
+                      <a:r>
+                        <a:rPr lang="de-CH" dirty="0" smtClean="0"/>
+                        <a:t>		</a:t>
+                      </a:r>
+                      <a:r>
+                        <a:rPr lang="de-CH" dirty="0" err="1" smtClean="0"/>
+                        <a:t>ActivityRecord</a:t>
                       </a:r>
                       <a:endParaRPr lang="de-CH" dirty="0"/>
                     </a:p>
@@ -7798,7 +7821,7 @@
                   <a:tcPr/>
                 </a:tc>
               </a:tr>
-              <a:tr h="323200">
+              <a:tr h="370840">
                 <a:tc gridSpan="2">
                   <a:txBody>
                     <a:bodyPr/>
@@ -7810,7 +7833,23 @@
                       </a:r>
                       <a:r>
                         <a:rPr lang="de-CH" b="1" dirty="0" smtClean="0"/>
-                        <a:t>:</a:t>
+                        <a:t>:	</a:t>
+                      </a:r>
+                      <a:r>
+                        <a:rPr lang="de-CH" dirty="0" smtClean="0"/>
+                        <a:t>		</a:t>
+                      </a:r>
+                      <a:r>
+                        <a:rPr lang="en-US" sz="1800" b="0" i="0" kern="1200" dirty="0" smtClean="0">
+                          <a:solidFill>
+                            <a:schemeClr val="tx1"/>
+                          </a:solidFill>
+                          <a:effectLst/>
+                          <a:latin typeface="+mn-lt"/>
+                          <a:ea typeface="+mn-ea"/>
+                          <a:cs typeface="+mn-cs"/>
+                        </a:rPr>
+                        <a:t>Represent an overview of the activity record</a:t>
                       </a:r>
                       <a:endParaRPr lang="de-CH" dirty="0"/>
                     </a:p>
@@ -7828,7 +7867,7 @@
                   <a:tcPr/>
                 </a:tc>
               </a:tr>
-              <a:tr h="4444003">
+              <a:tr h="370840">
                 <a:tc>
                   <a:txBody>
                     <a:bodyPr/>
@@ -7844,24 +7883,125 @@
                       </a:r>
                     </a:p>
                     <a:p>
-                      <a:endParaRPr lang="de-CH" dirty="0" smtClean="0"/>
+                      <a:endParaRPr lang="de-CH" b="1" dirty="0" smtClean="0"/>
                     </a:p>
                     <a:p>
-                      <a:endParaRPr lang="de-CH" dirty="0" smtClean="0"/>
+                      <a:pPr marL="285750" indent="-285750">
+                        <a:buFont typeface="Arial" charset="0"/>
+                        <a:buChar char="•"/>
+                      </a:pPr>
+                      <a:r>
+                        <a:rPr lang="en-US" dirty="0" smtClean="0"/>
+                        <a:t>shows </a:t>
+                      </a:r>
+                      <a:r>
+                        <a:rPr lang="en-US" dirty="0" smtClean="0"/>
+                        <a:t>the date of the exposition training</a:t>
+                      </a:r>
                     </a:p>
                     <a:p>
-                      <a:endParaRPr lang="de-CH" dirty="0" smtClean="0"/>
+                      <a:pPr marL="0" indent="0">
+                        <a:buFontTx/>
+                        <a:buNone/>
+                      </a:pPr>
+                      <a:endParaRPr lang="en-US" dirty="0" smtClean="0"/>
                     </a:p>
                     <a:p>
-                      <a:endParaRPr lang="de-CH" dirty="0" smtClean="0"/>
+                      <a:pPr marL="285750" indent="-285750">
+                        <a:buFont typeface="Arial" charset="0"/>
+                        <a:buChar char="•"/>
+                      </a:pPr>
+                      <a:r>
+                        <a:rPr lang="en-US" dirty="0" smtClean="0"/>
+                        <a:t>the </a:t>
+                      </a:r>
+                      <a:r>
+                        <a:rPr lang="en-US" dirty="0" smtClean="0"/>
+                        <a:t>description of the activity record for the </a:t>
+                      </a:r>
+                      <a:r>
+                        <a:rPr lang="en-US" dirty="0" smtClean="0"/>
+                        <a:t>exposition</a:t>
+                      </a:r>
+                      <a:r>
+                        <a:rPr lang="en-US" baseline="0" dirty="0" smtClean="0"/>
+                        <a:t> </a:t>
+                      </a:r>
+                      <a:r>
+                        <a:rPr lang="en-US" dirty="0" smtClean="0"/>
+                        <a:t>training </a:t>
+                      </a:r>
+                      <a:r>
+                        <a:rPr lang="en-US" dirty="0" smtClean="0"/>
+                        <a:t>can be described </a:t>
+                      </a:r>
+                      <a:r>
+                        <a:rPr lang="en-US" dirty="0" smtClean="0"/>
+                        <a:t>detailed</a:t>
+                      </a:r>
                     </a:p>
                     <a:p>
-                      <a:endParaRPr lang="de-CH" dirty="0" smtClean="0"/>
+                      <a:endParaRPr lang="en-US" dirty="0" smtClean="0"/>
                     </a:p>
                     <a:p>
-                      <a:endParaRPr lang="de-CH" dirty="0" smtClean="0"/>
+                      <a:pPr marL="285750" indent="-285750">
+                        <a:buFont typeface="Arial" charset="0"/>
+                        <a:buChar char="•"/>
+                      </a:pPr>
+                      <a:r>
+                        <a:rPr lang="en-US" dirty="0" smtClean="0"/>
+                        <a:t>can add image documents of the exposition training</a:t>
+                      </a:r>
                     </a:p>
                     <a:p>
+                      <a:pPr marL="0" indent="0">
+                        <a:buFontTx/>
+                        <a:buNone/>
+                      </a:pPr>
+                      <a:endParaRPr lang="en-US" dirty="0" smtClean="0"/>
+                    </a:p>
+                    <a:p>
+                      <a:pPr marL="285750" indent="-285750">
+                        <a:buFont typeface="Arial" charset="0"/>
+                        <a:buChar char="•"/>
+                      </a:pPr>
+                      <a:r>
+                        <a:rPr lang="en-US" dirty="0" smtClean="0"/>
+                        <a:t>the progress of the expositions training of this day can be  </a:t>
+                      </a:r>
+                      <a:r>
+                        <a:rPr lang="en-US" dirty="0" smtClean="0"/>
+                        <a:t>adjusted </a:t>
+                      </a:r>
+                      <a:r>
+                        <a:rPr lang="en-US" dirty="0" smtClean="0"/>
+                        <a:t>manually</a:t>
+                      </a:r>
+                    </a:p>
+                    <a:p>
+                      <a:pPr marL="0" indent="0">
+                        <a:buFontTx/>
+                        <a:buNone/>
+                      </a:pPr>
+                      <a:endParaRPr lang="en-US" dirty="0" smtClean="0"/>
+                    </a:p>
+                    <a:p>
+                      <a:pPr marL="285750" indent="-285750">
+                        <a:buFont typeface="Arial" charset="0"/>
+                        <a:buChar char="•"/>
+                      </a:pPr>
+                      <a:r>
+                        <a:rPr lang="en-US" dirty="0" smtClean="0"/>
+                        <a:t>shows </a:t>
+                      </a:r>
+                      <a:r>
+                        <a:rPr lang="en-US" dirty="0" smtClean="0"/>
+                        <a:t>the progress of the exposition training of this </a:t>
+                      </a:r>
+                      <a:r>
+                        <a:rPr lang="en-US" dirty="0" smtClean="0"/>
+                        <a:t>day</a:t>
+                      </a:r>
                       <a:endParaRPr lang="de-CH" dirty="0" smtClean="0"/>
                     </a:p>
                   </a:txBody>
@@ -7884,6 +8024,35 @@
                     <a:p>
                       <a:endParaRPr lang="de-CH" b="1" dirty="0" smtClean="0"/>
                     </a:p>
+                    <a:p>
+                      <a:pPr marL="285750" indent="-285750">
+                        <a:buFont typeface="Arial" charset="0"/>
+                        <a:buChar char="•"/>
+                      </a:pPr>
+                      <a:r>
+                        <a:rPr lang="en-US" dirty="0" smtClean="0"/>
+                        <a:t>the </a:t>
+                      </a:r>
+                      <a:r>
+                        <a:rPr lang="en-US" dirty="0" smtClean="0"/>
+                        <a:t>class activity takes the date of the activity record and </a:t>
+                      </a:r>
+                      <a:r>
+                        <a:rPr lang="en-US" dirty="0" smtClean="0"/>
+                        <a:t>its </a:t>
+                      </a:r>
+                      <a:r>
+                        <a:rPr lang="en-US" dirty="0" smtClean="0"/>
+                        <a:t>progress</a:t>
+                      </a:r>
+                    </a:p>
+                    <a:p>
+                      <a:r>
+                        <a:rPr lang="en-US" dirty="0" smtClean="0"/>
+                        <a:t>	</a:t>
+                      </a:r>
+                      <a:endParaRPr lang="de-CH" dirty="0"/>
+                    </a:p>
                   </a:txBody>
                   <a:tcPr/>
                 </a:tc>
@@ -7892,16 +8061,273 @@
           </a:graphicData>
         </a:graphic>
       </p:graphicFrame>
+      <p:sp>
+        <p:nvSpPr>
+          <p:cNvPr id="3" name="Titel 2"/>
+          <p:cNvSpPr>
+            <a:spLocks noGrp="1"/>
+          </p:cNvSpPr>
+          <p:nvPr>
+            <p:ph type="ctrTitle"/>
+          </p:nvPr>
+        </p:nvSpPr>
+        <p:spPr/>
+        <p:txBody>
+          <a:bodyPr/>
+          <a:lstStyle/>
+          <a:p>
+            <a:r>
+              <a:rPr lang="de-CH" dirty="0" smtClean="0"/>
+              <a:t>CRC </a:t>
+            </a:r>
+            <a:r>
+              <a:rPr lang="de-CH" dirty="0"/>
+              <a:t>Card - </a:t>
+            </a:r>
+            <a:r>
+              <a:rPr lang="de-CH" dirty="0" err="1"/>
+              <a:t>ActivityRecord</a:t>
+            </a:r>
+            <a:endParaRPr lang="de-CH" dirty="0"/>
+          </a:p>
+        </p:txBody>
+      </p:sp>
     </p:spTree>
     <p:extLst>
       <p:ext uri="{BB962C8B-B14F-4D97-AF65-F5344CB8AC3E}">
-        <p14:creationId xmlns:p14="http://schemas.microsoft.com/office/powerpoint/2010/main" val="3394188969"/>
+        <p14:creationId xmlns:p14="http://schemas.microsoft.com/office/powerpoint/2010/main" val="1465781760"/>
       </p:ext>
     </p:extLst>
   </p:cSld>
   <p:clrMapOvr>
     <a:masterClrMapping/>
   </p:clrMapOvr>
+  <p:timing>
+    <p:tnLst>
+      <p:par>
+        <p:cTn id="1" dur="indefinite" restart="never" nodeType="tmRoot"/>
+      </p:par>
+    </p:tnLst>
+  </p:timing>
+</p:sld>
+</file>
+
+<file path=ppt/slides/slide7.xml><?xml version="1.0" encoding="utf-8"?>
+<p:sld xmlns:a="http://schemas.openxmlformats.org/drawingml/2006/main" xmlns:r="http://schemas.openxmlformats.org/officeDocument/2006/relationships" xmlns:p="http://schemas.openxmlformats.org/presentationml/2006/main">
+  <p:cSld>
+    <p:spTree>
+      <p:nvGrpSpPr>
+        <p:cNvPr id="1" name=""/>
+        <p:cNvGrpSpPr/>
+        <p:nvPr/>
+      </p:nvGrpSpPr>
+      <p:grpSpPr>
+        <a:xfrm>
+          <a:off x="0" y="0"/>
+          <a:ext cx="0" cy="0"/>
+          <a:chOff x="0" y="0"/>
+          <a:chExt cx="0" cy="0"/>
+        </a:xfrm>
+      </p:grpSpPr>
+      <p:sp>
+        <p:nvSpPr>
+          <p:cNvPr id="2" name="Content Placeholder 1"/>
+          <p:cNvSpPr>
+            <a:spLocks noGrp="1"/>
+          </p:cNvSpPr>
+          <p:nvPr>
+            <p:ph sz="half" idx="1"/>
+          </p:nvPr>
+        </p:nvSpPr>
+        <p:spPr/>
+        <p:txBody>
+          <a:bodyPr/>
+          <a:lstStyle/>
+          <a:p>
+            <a:r>
+              <a:rPr lang="en-US" dirty="0" err="1" smtClean="0"/>
+              <a:t>Zeitmanagement</a:t>
+            </a:r>
+            <a:r>
+              <a:rPr lang="en-US" dirty="0" smtClean="0"/>
+              <a:t> </a:t>
+            </a:r>
+            <a:r>
+              <a:rPr lang="en-US" dirty="0" err="1" smtClean="0"/>
+              <a:t>verbessern</a:t>
+            </a:r>
+            <a:endParaRPr lang="en-US" dirty="0" smtClean="0"/>
+          </a:p>
+          <a:p>
+            <a:endParaRPr lang="en-US" dirty="0"/>
+          </a:p>
+          <a:p>
+            <a:r>
+              <a:rPr lang="en-US" dirty="0" err="1" smtClean="0"/>
+              <a:t>Haben</a:t>
+            </a:r>
+            <a:r>
+              <a:rPr lang="en-US" dirty="0" smtClean="0"/>
+              <a:t> nun </a:t>
+            </a:r>
+            <a:r>
+              <a:rPr lang="en-US" dirty="0" err="1" smtClean="0"/>
+              <a:t>mehr</a:t>
+            </a:r>
+            <a:r>
+              <a:rPr lang="en-US" dirty="0" smtClean="0"/>
+              <a:t> </a:t>
+            </a:r>
+            <a:r>
+              <a:rPr lang="en-US" dirty="0" err="1" smtClean="0"/>
+              <a:t>Klarheit</a:t>
+            </a:r>
+            <a:r>
+              <a:rPr lang="en-US" dirty="0" smtClean="0"/>
+              <a:t>, wo </a:t>
+            </a:r>
+            <a:r>
+              <a:rPr lang="en-US" dirty="0" err="1" smtClean="0"/>
+              <a:t>wir</a:t>
+            </a:r>
+            <a:r>
+              <a:rPr lang="en-US" dirty="0" smtClean="0"/>
+              <a:t> </a:t>
+            </a:r>
+            <a:r>
+              <a:rPr lang="en-US" dirty="0" err="1" smtClean="0"/>
+              <a:t>hinwollen</a:t>
+            </a:r>
+            <a:endParaRPr lang="en-US" dirty="0" smtClean="0"/>
+          </a:p>
+          <a:p>
+            <a:endParaRPr lang="en-US" dirty="0"/>
+          </a:p>
+        </p:txBody>
+      </p:sp>
+      <p:sp>
+        <p:nvSpPr>
+          <p:cNvPr id="3" name="Title 2"/>
+          <p:cNvSpPr>
+            <a:spLocks noGrp="1"/>
+          </p:cNvSpPr>
+          <p:nvPr>
+            <p:ph type="ctrTitle"/>
+          </p:nvPr>
+        </p:nvSpPr>
+        <p:spPr/>
+        <p:txBody>
+          <a:bodyPr/>
+          <a:lstStyle/>
+          <a:p>
+            <a:r>
+              <a:rPr lang="en-US" dirty="0" err="1" smtClean="0"/>
+              <a:t>Fazit</a:t>
+            </a:r>
+            <a:endParaRPr lang="en-US" dirty="0"/>
+          </a:p>
+        </p:txBody>
+      </p:sp>
+    </p:spTree>
+    <p:extLst>
+      <p:ext uri="{BB962C8B-B14F-4D97-AF65-F5344CB8AC3E}">
+        <p14:creationId xmlns:p14="http://schemas.microsoft.com/office/powerpoint/2010/main" val="112085760"/>
+      </p:ext>
+    </p:extLst>
+  </p:cSld>
+  <p:clrMapOvr>
+    <a:masterClrMapping/>
+  </p:clrMapOvr>
+  <p:timing>
+    <p:tnLst>
+      <p:par>
+        <p:cTn id="1" dur="indefinite" restart="never" nodeType="tmRoot"/>
+      </p:par>
+    </p:tnLst>
+  </p:timing>
+</p:sld>
+</file>
+
+<file path=ppt/slides/slide8.xml><?xml version="1.0" encoding="utf-8"?>
+<p:sld xmlns:a="http://schemas.openxmlformats.org/drawingml/2006/main" xmlns:r="http://schemas.openxmlformats.org/officeDocument/2006/relationships" xmlns:p="http://schemas.openxmlformats.org/presentationml/2006/main">
+  <p:cSld>
+    <p:spTree>
+      <p:nvGrpSpPr>
+        <p:cNvPr id="1" name=""/>
+        <p:cNvGrpSpPr/>
+        <p:nvPr/>
+      </p:nvGrpSpPr>
+      <p:grpSpPr>
+        <a:xfrm>
+          <a:off x="0" y="0"/>
+          <a:ext cx="0" cy="0"/>
+          <a:chOff x="0" y="0"/>
+          <a:chExt cx="0" cy="0"/>
+        </a:xfrm>
+      </p:grpSpPr>
+      <p:sp>
+        <p:nvSpPr>
+          <p:cNvPr id="2" name="Content Placeholder 1"/>
+          <p:cNvSpPr>
+            <a:spLocks noGrp="1"/>
+          </p:cNvSpPr>
+          <p:nvPr>
+            <p:ph sz="half" idx="1"/>
+          </p:nvPr>
+        </p:nvSpPr>
+        <p:spPr/>
+        <p:txBody>
+          <a:bodyPr/>
+          <a:lstStyle/>
+          <a:p>
+            <a:endParaRPr lang="en-US"/>
+          </a:p>
+        </p:txBody>
+      </p:sp>
+      <p:sp>
+        <p:nvSpPr>
+          <p:cNvPr id="3" name="Title 2"/>
+          <p:cNvSpPr>
+            <a:spLocks noGrp="1"/>
+          </p:cNvSpPr>
+          <p:nvPr>
+            <p:ph type="ctrTitle"/>
+          </p:nvPr>
+        </p:nvSpPr>
+        <p:spPr/>
+        <p:txBody>
+          <a:bodyPr/>
+          <a:lstStyle/>
+          <a:p>
+            <a:r>
+              <a:rPr lang="en-US" dirty="0" err="1" smtClean="0"/>
+              <a:t>Fragen</a:t>
+            </a:r>
+            <a:r>
+              <a:rPr lang="en-US" dirty="0" smtClean="0"/>
+              <a:t>?</a:t>
+            </a:r>
+            <a:endParaRPr lang="en-US" dirty="0"/>
+          </a:p>
+        </p:txBody>
+      </p:sp>
+    </p:spTree>
+    <p:extLst>
+      <p:ext uri="{BB962C8B-B14F-4D97-AF65-F5344CB8AC3E}">
+        <p14:creationId xmlns:p14="http://schemas.microsoft.com/office/powerpoint/2010/main" val="1834628448"/>
+      </p:ext>
+    </p:extLst>
+  </p:cSld>
+  <p:clrMapOvr>
+    <a:masterClrMapping/>
+  </p:clrMapOvr>
+  <p:timing>
+    <p:tnLst>
+      <p:par>
+        <p:cTn id="1" dur="indefinite" restart="never" nodeType="tmRoot"/>
+      </p:par>
+    </p:tnLst>
+  </p:timing>
 </p:sld>
 </file>
 
@@ -8511,12 +8937,19 @@
 </file>
 
 <file path=customXml/item1.xml><?xml version="1.0" encoding="utf-8"?>
-<?mso-contentType ?>
-<FormTemplates xmlns="http://schemas.microsoft.com/sharepoint/v3/contenttype/forms">
-  <Display>DocumentLibraryForm</Display>
-  <Edit>DocumentLibraryForm</Edit>
-  <New>DocumentLibraryForm</New>
-</FormTemplates>
+<p:properties xmlns:p="http://schemas.microsoft.com/office/2006/metadata/properties" xmlns:xsi="http://www.w3.org/2001/XMLSchema-instance" xmlns:pc="http://schemas.microsoft.com/office/infopath/2007/PartnerControls">
+  <documentManagement>
+    <QMPilot_DokID xmlns="2551ef7e-3b29-44d1-a8ad-ef34c26bfc60">470</QMPilot_DokID>
+    <BfhIntranetDepartmentText xmlns="f6f68f68-5570-446d-b1e6-2310e70d83d3">
+      <Terms xmlns="http://schemas.microsoft.com/office/infopath/2007/PartnerControls">
+        <TermInfo xmlns="http://schemas.microsoft.com/office/infopath/2007/PartnerControls">
+          <TermName xmlns="http://schemas.microsoft.com/office/infopath/2007/PartnerControls">Vorlage</TermName>
+          <TermId xmlns="http://schemas.microsoft.com/office/infopath/2007/PartnerControls">de1a6d3c-ac6a-4b34-8edd-308eb81066db</TermId>
+        </TermInfo>
+      </Terms>
+    </BfhIntranetDepartmentText>
+  </documentManagement>
+</p:properties>
 </file>
 
 <file path=customXml/item2.xml><?xml version="1.0" encoding="utf-8"?>
@@ -8659,25 +9092,21 @@
 </file>
 
 <file path=customXml/item3.xml><?xml version="1.0" encoding="utf-8"?>
-<p:properties xmlns:p="http://schemas.microsoft.com/office/2006/metadata/properties" xmlns:xsi="http://www.w3.org/2001/XMLSchema-instance" xmlns:pc="http://schemas.microsoft.com/office/infopath/2007/PartnerControls">
-  <documentManagement>
-    <QMPilot_DokID xmlns="2551ef7e-3b29-44d1-a8ad-ef34c26bfc60">470</QMPilot_DokID>
-    <BfhIntranetDepartmentText xmlns="f6f68f68-5570-446d-b1e6-2310e70d83d3">
-      <Terms xmlns="http://schemas.microsoft.com/office/infopath/2007/PartnerControls">
-        <TermInfo xmlns="http://schemas.microsoft.com/office/infopath/2007/PartnerControls">
-          <TermName xmlns="http://schemas.microsoft.com/office/infopath/2007/PartnerControls">Vorlage</TermName>
-          <TermId xmlns="http://schemas.microsoft.com/office/infopath/2007/PartnerControls">de1a6d3c-ac6a-4b34-8edd-308eb81066db</TermId>
-        </TermInfo>
-      </Terms>
-    </BfhIntranetDepartmentText>
-  </documentManagement>
-</p:properties>
+<?mso-contentType ?>
+<FormTemplates xmlns="http://schemas.microsoft.com/sharepoint/v3/contenttype/forms">
+  <Display>DocumentLibraryForm</Display>
+  <Edit>DocumentLibraryForm</Edit>
+  <New>DocumentLibraryForm</New>
+</FormTemplates>
 </file>
 
 <file path=customXml/itemProps1.xml><?xml version="1.0" encoding="utf-8"?>
-<ds:datastoreItem xmlns:ds="http://schemas.openxmlformats.org/officeDocument/2006/customXml" ds:itemID="{9D47BE21-B709-4D16-ABB2-11D40677E528}">
+<ds:datastoreItem xmlns:ds="http://schemas.openxmlformats.org/officeDocument/2006/customXml" ds:itemID="{A0E21803-70F9-41A8-9C11-39A2457CDDF7}">
   <ds:schemaRefs>
-    <ds:schemaRef ds:uri="http://schemas.microsoft.com/sharepoint/v3/contenttype/forms"/>
+    <ds:schemaRef ds:uri="http://schemas.microsoft.com/office/2006/metadata/properties"/>
+    <ds:schemaRef ds:uri="http://schemas.microsoft.com/office/infopath/2007/PartnerControls"/>
+    <ds:schemaRef ds:uri="2551ef7e-3b29-44d1-a8ad-ef34c26bfc60"/>
+    <ds:schemaRef ds:uri="f6f68f68-5570-446d-b1e6-2310e70d83d3"/>
   </ds:schemaRefs>
 </ds:datastoreItem>
 </file>
@@ -8702,12 +9131,9 @@
 </file>
 
 <file path=customXml/itemProps3.xml><?xml version="1.0" encoding="utf-8"?>
-<ds:datastoreItem xmlns:ds="http://schemas.openxmlformats.org/officeDocument/2006/customXml" ds:itemID="{A0E21803-70F9-41A8-9C11-39A2457CDDF7}">
+<ds:datastoreItem xmlns:ds="http://schemas.openxmlformats.org/officeDocument/2006/customXml" ds:itemID="{9D47BE21-B709-4D16-ABB2-11D40677E528}">
   <ds:schemaRefs>
-    <ds:schemaRef ds:uri="http://schemas.microsoft.com/office/2006/metadata/properties"/>
-    <ds:schemaRef ds:uri="http://schemas.microsoft.com/office/infopath/2007/PartnerControls"/>
-    <ds:schemaRef ds:uri="2551ef7e-3b29-44d1-a8ad-ef34c26bfc60"/>
-    <ds:schemaRef ds:uri="f6f68f68-5570-446d-b1e6-2310e70d83d3"/>
+    <ds:schemaRef ds:uri="http://schemas.microsoft.com/sharepoint/v3/contenttype/forms"/>
   </ds:schemaRefs>
 </ds:datastoreItem>
 </file>
</xml_diff>

<commit_message>
update order of slides presentatino
</commit_message>
<xml_diff>
--- a/CaseStudies/CaseStudy2/doc/02-DomainModelAndSequenceDiagram/Task_2_Presentation.pptx
+++ b/CaseStudies/CaseStudy2/doc/02-DomainModelAndSequenceDiagram/Task_2_Presentation.pptx
@@ -10,10 +10,10 @@
   <p:sldIdLst>
     <p:sldId id="256" r:id="rId5"/>
     <p:sldId id="257" r:id="rId6"/>
-    <p:sldId id="258" r:id="rId7"/>
+    <p:sldId id="261" r:id="rId7"/>
     <p:sldId id="259" r:id="rId8"/>
     <p:sldId id="264" r:id="rId9"/>
-    <p:sldId id="261" r:id="rId10"/>
+    <p:sldId id="258" r:id="rId10"/>
     <p:sldId id="265" r:id="rId11"/>
     <p:sldId id="266" r:id="rId12"/>
   </p:sldIdLst>
@@ -6955,6 +6955,261 @@
           <a:chExt cx="0" cy="0"/>
         </a:xfrm>
       </p:grpSpPr>
+      <p:graphicFrame>
+        <p:nvGraphicFramePr>
+          <p:cNvPr id="5" name="Inhaltsplatzhalter 4"/>
+          <p:cNvGraphicFramePr>
+            <a:graphicFrameLocks noGrp="1"/>
+          </p:cNvGraphicFramePr>
+          <p:nvPr>
+            <p:ph sz="half" idx="1"/>
+            <p:extLst>
+              <p:ext uri="{D42A27DB-BD31-4B8C-83A1-F6EECF244321}">
+                <p14:modId xmlns:p14="http://schemas.microsoft.com/office/powerpoint/2010/main" val="1416842763"/>
+              </p:ext>
+            </p:extLst>
+          </p:nvPr>
+        </p:nvGraphicFramePr>
+        <p:xfrm>
+          <a:off x="457200" y="1331913"/>
+          <a:ext cx="11249026" cy="4673600"/>
+        </p:xfrm>
+        <a:graphic>
+          <a:graphicData uri="http://schemas.openxmlformats.org/drawingml/2006/table">
+            <a:tbl>
+              <a:tblPr firstRow="1" bandRow="1">
+                <a:tableStyleId>{5940675A-B579-460E-94D1-54222C63F5DA}</a:tableStyleId>
+              </a:tblPr>
+              <a:tblGrid>
+                <a:gridCol w="5624513"/>
+                <a:gridCol w="5624513"/>
+              </a:tblGrid>
+              <a:tr h="370840">
+                <a:tc gridSpan="2">
+                  <a:txBody>
+                    <a:bodyPr/>
+                    <a:lstStyle/>
+                    <a:p>
+                      <a:r>
+                        <a:rPr lang="de-CH" b="1" dirty="0" smtClean="0"/>
+                        <a:t>Class Name:</a:t>
+                      </a:r>
+                      <a:r>
+                        <a:rPr lang="de-CH" dirty="0" smtClean="0"/>
+                        <a:t>		</a:t>
+                      </a:r>
+                      <a:r>
+                        <a:rPr lang="de-CH" dirty="0" err="1" smtClean="0"/>
+                        <a:t>ActivityRecord</a:t>
+                      </a:r>
+                      <a:endParaRPr lang="de-CH" dirty="0"/>
+                    </a:p>
+                  </a:txBody>
+                  <a:tcPr/>
+                </a:tc>
+                <a:tc hMerge="1">
+                  <a:txBody>
+                    <a:bodyPr/>
+                    <a:lstStyle/>
+                    <a:p>
+                      <a:endParaRPr lang="de-CH" dirty="0"/>
+                    </a:p>
+                  </a:txBody>
+                  <a:tcPr/>
+                </a:tc>
+              </a:tr>
+              <a:tr h="370840">
+                <a:tc gridSpan="2">
+                  <a:txBody>
+                    <a:bodyPr/>
+                    <a:lstStyle/>
+                    <a:p>
+                      <a:r>
+                        <a:rPr lang="de-CH" b="1" dirty="0" err="1" smtClean="0"/>
+                        <a:t>Purpose</a:t>
+                      </a:r>
+                      <a:r>
+                        <a:rPr lang="de-CH" b="1" dirty="0" smtClean="0"/>
+                        <a:t>:	</a:t>
+                      </a:r>
+                      <a:r>
+                        <a:rPr lang="de-CH" dirty="0" smtClean="0"/>
+                        <a:t>		</a:t>
+                      </a:r>
+                      <a:r>
+                        <a:rPr lang="en-US" sz="1800" b="0" i="0" kern="1200" dirty="0" smtClean="0">
+                          <a:solidFill>
+                            <a:schemeClr val="tx1"/>
+                          </a:solidFill>
+                          <a:effectLst/>
+                          <a:latin typeface="+mn-lt"/>
+                          <a:ea typeface="+mn-ea"/>
+                          <a:cs typeface="+mn-cs"/>
+                        </a:rPr>
+                        <a:t>Represent an overview of the activity record</a:t>
+                      </a:r>
+                      <a:endParaRPr lang="de-CH" dirty="0"/>
+                    </a:p>
+                  </a:txBody>
+                  <a:tcPr/>
+                </a:tc>
+                <a:tc hMerge="1">
+                  <a:txBody>
+                    <a:bodyPr/>
+                    <a:lstStyle/>
+                    <a:p>
+                      <a:endParaRPr lang="de-CH" dirty="0"/>
+                    </a:p>
+                  </a:txBody>
+                  <a:tcPr/>
+                </a:tc>
+              </a:tr>
+              <a:tr h="370840">
+                <a:tc>
+                  <a:txBody>
+                    <a:bodyPr/>
+                    <a:lstStyle/>
+                    <a:p>
+                      <a:r>
+                        <a:rPr lang="de-CH" b="1" dirty="0" err="1" smtClean="0"/>
+                        <a:t>Responsibilities</a:t>
+                      </a:r>
+                      <a:r>
+                        <a:rPr lang="de-CH" b="1" dirty="0" smtClean="0"/>
+                        <a:t>:</a:t>
+                      </a:r>
+                    </a:p>
+                    <a:p>
+                      <a:endParaRPr lang="de-CH" b="1" dirty="0" smtClean="0"/>
+                    </a:p>
+                    <a:p>
+                      <a:pPr marL="285750" indent="-285750">
+                        <a:buFont typeface="Arial" charset="0"/>
+                        <a:buChar char="•"/>
+                      </a:pPr>
+                      <a:r>
+                        <a:rPr lang="en-US" dirty="0" smtClean="0"/>
+                        <a:t>shows the date of the exposition training</a:t>
+                      </a:r>
+                    </a:p>
+                    <a:p>
+                      <a:pPr marL="0" indent="0">
+                        <a:buFontTx/>
+                        <a:buNone/>
+                      </a:pPr>
+                      <a:endParaRPr lang="en-US" dirty="0" smtClean="0"/>
+                    </a:p>
+                    <a:p>
+                      <a:pPr marL="285750" indent="-285750">
+                        <a:buFont typeface="Arial" charset="0"/>
+                        <a:buChar char="•"/>
+                      </a:pPr>
+                      <a:r>
+                        <a:rPr lang="en-US" dirty="0" smtClean="0"/>
+                        <a:t>the description of the activity record for the exposition</a:t>
+                      </a:r>
+                      <a:r>
+                        <a:rPr lang="en-US" baseline="0" dirty="0" smtClean="0"/>
+                        <a:t> </a:t>
+                      </a:r>
+                      <a:r>
+                        <a:rPr lang="en-US" dirty="0" smtClean="0"/>
+                        <a:t>training can be described detailed</a:t>
+                      </a:r>
+                    </a:p>
+                    <a:p>
+                      <a:endParaRPr lang="en-US" dirty="0" smtClean="0"/>
+                    </a:p>
+                    <a:p>
+                      <a:pPr marL="285750" indent="-285750">
+                        <a:buFont typeface="Arial" charset="0"/>
+                        <a:buChar char="•"/>
+                      </a:pPr>
+                      <a:r>
+                        <a:rPr lang="en-US" dirty="0" smtClean="0"/>
+                        <a:t>can add image documents of the exposition training</a:t>
+                      </a:r>
+                    </a:p>
+                    <a:p>
+                      <a:pPr marL="0" indent="0">
+                        <a:buFontTx/>
+                        <a:buNone/>
+                      </a:pPr>
+                      <a:endParaRPr lang="en-US" dirty="0" smtClean="0"/>
+                    </a:p>
+                    <a:p>
+                      <a:pPr marL="285750" indent="-285750">
+                        <a:buFont typeface="Arial" charset="0"/>
+                        <a:buChar char="•"/>
+                      </a:pPr>
+                      <a:r>
+                        <a:rPr lang="en-US" dirty="0" smtClean="0"/>
+                        <a:t>the progress of the expositions training of this day can be  adjusted manually</a:t>
+                      </a:r>
+                    </a:p>
+                    <a:p>
+                      <a:pPr marL="0" indent="0">
+                        <a:buFontTx/>
+                        <a:buNone/>
+                      </a:pPr>
+                      <a:endParaRPr lang="en-US" dirty="0" smtClean="0"/>
+                    </a:p>
+                    <a:p>
+                      <a:pPr marL="285750" indent="-285750">
+                        <a:buFont typeface="Arial" charset="0"/>
+                        <a:buChar char="•"/>
+                      </a:pPr>
+                      <a:r>
+                        <a:rPr lang="en-US" dirty="0" smtClean="0"/>
+                        <a:t>shows the progress of the exposition training of this day</a:t>
+                      </a:r>
+                      <a:endParaRPr lang="de-CH" dirty="0" smtClean="0"/>
+                    </a:p>
+                  </a:txBody>
+                  <a:tcPr/>
+                </a:tc>
+                <a:tc>
+                  <a:txBody>
+                    <a:bodyPr/>
+                    <a:lstStyle/>
+                    <a:p>
+                      <a:r>
+                        <a:rPr lang="de-CH" b="1" dirty="0" err="1" smtClean="0"/>
+                        <a:t>Collaborators</a:t>
+                      </a:r>
+                      <a:r>
+                        <a:rPr lang="de-CH" b="1" dirty="0" smtClean="0"/>
+                        <a:t>:</a:t>
+                      </a:r>
+                    </a:p>
+                    <a:p>
+                      <a:endParaRPr lang="de-CH" b="1" dirty="0" smtClean="0"/>
+                    </a:p>
+                    <a:p>
+                      <a:pPr marL="285750" indent="-285750">
+                        <a:buFont typeface="Arial" charset="0"/>
+                        <a:buChar char="•"/>
+                      </a:pPr>
+                      <a:r>
+                        <a:rPr lang="en-US" dirty="0" smtClean="0"/>
+                        <a:t>the class activity takes the date of the activity record and its progress</a:t>
+                      </a:r>
+                    </a:p>
+                    <a:p>
+                      <a:r>
+                        <a:rPr lang="en-US" dirty="0" smtClean="0"/>
+                        <a:t>	</a:t>
+                      </a:r>
+                      <a:endParaRPr lang="de-CH" dirty="0"/>
+                    </a:p>
+                  </a:txBody>
+                  <a:tcPr/>
+                </a:tc>
+              </a:tr>
+            </a:tbl>
+          </a:graphicData>
+        </a:graphic>
+      </p:graphicFrame>
       <p:sp>
         <p:nvSpPr>
           <p:cNvPr id="3" name="Titel 2"/>
@@ -6971,66 +7226,25 @@
           <a:lstStyle/>
           <a:p>
             <a:r>
-              <a:rPr lang="de-CH" dirty="0" err="1" smtClean="0"/>
-              <a:t>Sequence</a:t>
-            </a:r>
-            <a:r>
               <a:rPr lang="de-CH" dirty="0" smtClean="0"/>
-              <a:t> </a:t>
-            </a:r>
-            <a:r>
-              <a:rPr lang="de-CH" dirty="0" err="1" smtClean="0"/>
-              <a:t>Diagram</a:t>
-            </a:r>
-            <a:r>
-              <a:rPr lang="de-CH" dirty="0" smtClean="0"/>
-              <a:t> – Alert </a:t>
-            </a:r>
-            <a:r>
-              <a:rPr lang="de-CH" dirty="0" err="1" smtClean="0"/>
-              <a:t>Danger</a:t>
-            </a:r>
-            <a:r>
-              <a:rPr lang="de-CH" dirty="0" smtClean="0"/>
-              <a:t> Notes</a:t>
+              <a:t>CRC </a:t>
+            </a:r>
+            <a:r>
+              <a:rPr lang="de-CH" dirty="0"/>
+              <a:t>Card - </a:t>
+            </a:r>
+            <a:r>
+              <a:rPr lang="de-CH" dirty="0" err="1"/>
+              <a:t>ActivityRecord</a:t>
             </a:r>
             <a:endParaRPr lang="de-CH" dirty="0"/>
           </a:p>
         </p:txBody>
       </p:sp>
-      <p:pic>
-        <p:nvPicPr>
-          <p:cNvPr id="4" name="Grafik 3"/>
-          <p:cNvPicPr>
-            <a:picLocks noChangeAspect="1"/>
-          </p:cNvPicPr>
-          <p:nvPr/>
-        </p:nvPicPr>
-        <p:blipFill rotWithShape="1">
-          <a:blip r:embed="rId2">
-            <a:extLst>
-              <a:ext uri="{28A0092B-C50C-407E-A947-70E740481C1C}">
-                <a14:useLocalDpi xmlns:a14="http://schemas.microsoft.com/office/drawing/2010/main" val="0"/>
-              </a:ext>
-            </a:extLst>
-          </a:blip>
-          <a:srcRect t="12936" b="13931"/>
-          <a:stretch/>
-        </p:blipFill>
-        <p:spPr>
-          <a:xfrm>
-            <a:off x="2430873" y="900000"/>
-            <a:ext cx="7177587" cy="5249156"/>
-          </a:xfrm>
-          <a:prstGeom prst="rect">
-            <a:avLst/>
-          </a:prstGeom>
-        </p:spPr>
-      </p:pic>
     </p:spTree>
     <p:extLst>
       <p:ext uri="{BB962C8B-B14F-4D97-AF65-F5344CB8AC3E}">
-        <p14:creationId xmlns:p14="http://schemas.microsoft.com/office/powerpoint/2010/main" val="1312568616"/>
+        <p14:creationId xmlns:p14="http://schemas.microsoft.com/office/powerpoint/2010/main" val="1465781760"/>
       </p:ext>
     </p:extLst>
   </p:cSld>
@@ -7414,11 +7628,7 @@
                       </a:r>
                       <a:r>
                         <a:rPr lang="de-CH" dirty="0" smtClean="0"/>
-                        <a:t> </a:t>
-                      </a:r>
-                      <a:r>
-                        <a:rPr lang="de-CH" dirty="0" smtClean="0"/>
-                        <a:t>a title (</a:t>
+                        <a:t> a title (</a:t>
                       </a:r>
                       <a:r>
                         <a:rPr lang="de-CH" i="1" dirty="0" smtClean="0"/>
@@ -7515,11 +7725,7 @@
                       </a:r>
                       <a:r>
                         <a:rPr lang="de-CH" dirty="0" smtClean="0"/>
-                        <a:t> </a:t>
-                      </a:r>
-                      <a:r>
-                        <a:rPr lang="de-CH" dirty="0" smtClean="0"/>
-                        <a:t>a </a:t>
+                        <a:t> a </a:t>
                       </a:r>
                       <a:r>
                         <a:rPr lang="de-CH" dirty="0" err="1" smtClean="0"/>
@@ -7681,11 +7887,7 @@
                       </a:r>
                       <a:r>
                         <a:rPr lang="de-CH" b="0" dirty="0" smtClean="0"/>
-                        <a:t> </a:t>
-                      </a:r>
-                      <a:r>
-                        <a:rPr lang="de-CH" b="0" dirty="0" smtClean="0"/>
-                        <a:t>a normal </a:t>
+                        <a:t> a normal </a:t>
                       </a:r>
                       <a:r>
                         <a:rPr lang="de-CH" b="0" dirty="0" err="1" smtClean="0"/>
@@ -7758,309 +7960,6 @@
           <a:chExt cx="0" cy="0"/>
         </a:xfrm>
       </p:grpSpPr>
-      <p:graphicFrame>
-        <p:nvGraphicFramePr>
-          <p:cNvPr id="5" name="Inhaltsplatzhalter 4"/>
-          <p:cNvGraphicFramePr>
-            <a:graphicFrameLocks noGrp="1"/>
-          </p:cNvGraphicFramePr>
-          <p:nvPr>
-            <p:ph sz="half" idx="1"/>
-            <p:extLst>
-              <p:ext uri="{D42A27DB-BD31-4B8C-83A1-F6EECF244321}">
-                <p14:modId xmlns:p14="http://schemas.microsoft.com/office/powerpoint/2010/main" val="1416842763"/>
-              </p:ext>
-            </p:extLst>
-          </p:nvPr>
-        </p:nvGraphicFramePr>
-        <p:xfrm>
-          <a:off x="457200" y="1331913"/>
-          <a:ext cx="11249026" cy="4673600"/>
-        </p:xfrm>
-        <a:graphic>
-          <a:graphicData uri="http://schemas.openxmlformats.org/drawingml/2006/table">
-            <a:tbl>
-              <a:tblPr firstRow="1" bandRow="1">
-                <a:tableStyleId>{5940675A-B579-460E-94D1-54222C63F5DA}</a:tableStyleId>
-              </a:tblPr>
-              <a:tblGrid>
-                <a:gridCol w="5624513"/>
-                <a:gridCol w="5624513"/>
-              </a:tblGrid>
-              <a:tr h="370840">
-                <a:tc gridSpan="2">
-                  <a:txBody>
-                    <a:bodyPr/>
-                    <a:lstStyle/>
-                    <a:p>
-                      <a:r>
-                        <a:rPr lang="de-CH" b="1" dirty="0" smtClean="0"/>
-                        <a:t>Class Name:</a:t>
-                      </a:r>
-                      <a:r>
-                        <a:rPr lang="de-CH" dirty="0" smtClean="0"/>
-                        <a:t>		</a:t>
-                      </a:r>
-                      <a:r>
-                        <a:rPr lang="de-CH" dirty="0" err="1" smtClean="0"/>
-                        <a:t>ActivityRecord</a:t>
-                      </a:r>
-                      <a:endParaRPr lang="de-CH" dirty="0"/>
-                    </a:p>
-                  </a:txBody>
-                  <a:tcPr/>
-                </a:tc>
-                <a:tc hMerge="1">
-                  <a:txBody>
-                    <a:bodyPr/>
-                    <a:lstStyle/>
-                    <a:p>
-                      <a:endParaRPr lang="de-CH" dirty="0"/>
-                    </a:p>
-                  </a:txBody>
-                  <a:tcPr/>
-                </a:tc>
-              </a:tr>
-              <a:tr h="370840">
-                <a:tc gridSpan="2">
-                  <a:txBody>
-                    <a:bodyPr/>
-                    <a:lstStyle/>
-                    <a:p>
-                      <a:r>
-                        <a:rPr lang="de-CH" b="1" dirty="0" err="1" smtClean="0"/>
-                        <a:t>Purpose</a:t>
-                      </a:r>
-                      <a:r>
-                        <a:rPr lang="de-CH" b="1" dirty="0" smtClean="0"/>
-                        <a:t>:	</a:t>
-                      </a:r>
-                      <a:r>
-                        <a:rPr lang="de-CH" dirty="0" smtClean="0"/>
-                        <a:t>		</a:t>
-                      </a:r>
-                      <a:r>
-                        <a:rPr lang="en-US" sz="1800" b="0" i="0" kern="1200" dirty="0" smtClean="0">
-                          <a:solidFill>
-                            <a:schemeClr val="tx1"/>
-                          </a:solidFill>
-                          <a:effectLst/>
-                          <a:latin typeface="+mn-lt"/>
-                          <a:ea typeface="+mn-ea"/>
-                          <a:cs typeface="+mn-cs"/>
-                        </a:rPr>
-                        <a:t>Represent an overview of the activity record</a:t>
-                      </a:r>
-                      <a:endParaRPr lang="de-CH" dirty="0"/>
-                    </a:p>
-                  </a:txBody>
-                  <a:tcPr/>
-                </a:tc>
-                <a:tc hMerge="1">
-                  <a:txBody>
-                    <a:bodyPr/>
-                    <a:lstStyle/>
-                    <a:p>
-                      <a:endParaRPr lang="de-CH" dirty="0"/>
-                    </a:p>
-                  </a:txBody>
-                  <a:tcPr/>
-                </a:tc>
-              </a:tr>
-              <a:tr h="370840">
-                <a:tc>
-                  <a:txBody>
-                    <a:bodyPr/>
-                    <a:lstStyle/>
-                    <a:p>
-                      <a:r>
-                        <a:rPr lang="de-CH" b="1" dirty="0" err="1" smtClean="0"/>
-                        <a:t>Responsibilities</a:t>
-                      </a:r>
-                      <a:r>
-                        <a:rPr lang="de-CH" b="1" dirty="0" smtClean="0"/>
-                        <a:t>:</a:t>
-                      </a:r>
-                    </a:p>
-                    <a:p>
-                      <a:endParaRPr lang="de-CH" b="1" dirty="0" smtClean="0"/>
-                    </a:p>
-                    <a:p>
-                      <a:pPr marL="285750" indent="-285750">
-                        <a:buFont typeface="Arial" charset="0"/>
-                        <a:buChar char="•"/>
-                      </a:pPr>
-                      <a:r>
-                        <a:rPr lang="en-US" dirty="0" smtClean="0"/>
-                        <a:t>shows </a:t>
-                      </a:r>
-                      <a:r>
-                        <a:rPr lang="en-US" dirty="0" smtClean="0"/>
-                        <a:t>the date of the exposition training</a:t>
-                      </a:r>
-                    </a:p>
-                    <a:p>
-                      <a:pPr marL="0" indent="0">
-                        <a:buFontTx/>
-                        <a:buNone/>
-                      </a:pPr>
-                      <a:endParaRPr lang="en-US" dirty="0" smtClean="0"/>
-                    </a:p>
-                    <a:p>
-                      <a:pPr marL="285750" indent="-285750">
-                        <a:buFont typeface="Arial" charset="0"/>
-                        <a:buChar char="•"/>
-                      </a:pPr>
-                      <a:r>
-                        <a:rPr lang="en-US" dirty="0" smtClean="0"/>
-                        <a:t>the </a:t>
-                      </a:r>
-                      <a:r>
-                        <a:rPr lang="en-US" dirty="0" smtClean="0"/>
-                        <a:t>description of the activity record for the </a:t>
-                      </a:r>
-                      <a:r>
-                        <a:rPr lang="en-US" dirty="0" smtClean="0"/>
-                        <a:t>exposition</a:t>
-                      </a:r>
-                      <a:r>
-                        <a:rPr lang="en-US" baseline="0" dirty="0" smtClean="0"/>
-                        <a:t> </a:t>
-                      </a:r>
-                      <a:r>
-                        <a:rPr lang="en-US" dirty="0" smtClean="0"/>
-                        <a:t>training </a:t>
-                      </a:r>
-                      <a:r>
-                        <a:rPr lang="en-US" dirty="0" smtClean="0"/>
-                        <a:t>can be described </a:t>
-                      </a:r>
-                      <a:r>
-                        <a:rPr lang="en-US" dirty="0" smtClean="0"/>
-                        <a:t>detailed</a:t>
-                      </a:r>
-                    </a:p>
-                    <a:p>
-                      <a:endParaRPr lang="en-US" dirty="0" smtClean="0"/>
-                    </a:p>
-                    <a:p>
-                      <a:pPr marL="285750" indent="-285750">
-                        <a:buFont typeface="Arial" charset="0"/>
-                        <a:buChar char="•"/>
-                      </a:pPr>
-                      <a:r>
-                        <a:rPr lang="en-US" dirty="0" smtClean="0"/>
-                        <a:t>can add image documents of the exposition training</a:t>
-                      </a:r>
-                    </a:p>
-                    <a:p>
-                      <a:pPr marL="0" indent="0">
-                        <a:buFontTx/>
-                        <a:buNone/>
-                      </a:pPr>
-                      <a:endParaRPr lang="en-US" dirty="0" smtClean="0"/>
-                    </a:p>
-                    <a:p>
-                      <a:pPr marL="285750" indent="-285750">
-                        <a:buFont typeface="Arial" charset="0"/>
-                        <a:buChar char="•"/>
-                      </a:pPr>
-                      <a:r>
-                        <a:rPr lang="en-US" dirty="0" smtClean="0"/>
-                        <a:t>the progress of the expositions training of this day can be  </a:t>
-                      </a:r>
-                      <a:r>
-                        <a:rPr lang="en-US" dirty="0" smtClean="0"/>
-                        <a:t>adjusted </a:t>
-                      </a:r>
-                      <a:r>
-                        <a:rPr lang="en-US" dirty="0" smtClean="0"/>
-                        <a:t>manually</a:t>
-                      </a:r>
-                    </a:p>
-                    <a:p>
-                      <a:pPr marL="0" indent="0">
-                        <a:buFontTx/>
-                        <a:buNone/>
-                      </a:pPr>
-                      <a:endParaRPr lang="en-US" dirty="0" smtClean="0"/>
-                    </a:p>
-                    <a:p>
-                      <a:pPr marL="285750" indent="-285750">
-                        <a:buFont typeface="Arial" charset="0"/>
-                        <a:buChar char="•"/>
-                      </a:pPr>
-                      <a:r>
-                        <a:rPr lang="en-US" dirty="0" smtClean="0"/>
-                        <a:t>shows </a:t>
-                      </a:r>
-                      <a:r>
-                        <a:rPr lang="en-US" dirty="0" smtClean="0"/>
-                        <a:t>the progress of the exposition training of this </a:t>
-                      </a:r>
-                      <a:r>
-                        <a:rPr lang="en-US" dirty="0" smtClean="0"/>
-                        <a:t>day</a:t>
-                      </a:r>
-                      <a:endParaRPr lang="de-CH" dirty="0" smtClean="0"/>
-                    </a:p>
-                  </a:txBody>
-                  <a:tcPr/>
-                </a:tc>
-                <a:tc>
-                  <a:txBody>
-                    <a:bodyPr/>
-                    <a:lstStyle/>
-                    <a:p>
-                      <a:r>
-                        <a:rPr lang="de-CH" b="1" dirty="0" err="1" smtClean="0"/>
-                        <a:t>Collaborators</a:t>
-                      </a:r>
-                      <a:r>
-                        <a:rPr lang="de-CH" b="1" dirty="0" smtClean="0"/>
-                        <a:t>:</a:t>
-                      </a:r>
-                    </a:p>
-                    <a:p>
-                      <a:endParaRPr lang="de-CH" b="1" dirty="0" smtClean="0"/>
-                    </a:p>
-                    <a:p>
-                      <a:pPr marL="285750" indent="-285750">
-                        <a:buFont typeface="Arial" charset="0"/>
-                        <a:buChar char="•"/>
-                      </a:pPr>
-                      <a:r>
-                        <a:rPr lang="en-US" dirty="0" smtClean="0"/>
-                        <a:t>the </a:t>
-                      </a:r>
-                      <a:r>
-                        <a:rPr lang="en-US" dirty="0" smtClean="0"/>
-                        <a:t>class activity takes the date of the activity record and </a:t>
-                      </a:r>
-                      <a:r>
-                        <a:rPr lang="en-US" dirty="0" smtClean="0"/>
-                        <a:t>its </a:t>
-                      </a:r>
-                      <a:r>
-                        <a:rPr lang="en-US" dirty="0" smtClean="0"/>
-                        <a:t>progress</a:t>
-                      </a:r>
-                    </a:p>
-                    <a:p>
-                      <a:r>
-                        <a:rPr lang="en-US" dirty="0" smtClean="0"/>
-                        <a:t>	</a:t>
-                      </a:r>
-                      <a:endParaRPr lang="de-CH" dirty="0"/>
-                    </a:p>
-                  </a:txBody>
-                  <a:tcPr/>
-                </a:tc>
-              </a:tr>
-            </a:tbl>
-          </a:graphicData>
-        </a:graphic>
-      </p:graphicFrame>
       <p:sp>
         <p:nvSpPr>
           <p:cNvPr id="3" name="Titel 2"/>
@@ -8077,25 +7976,66 @@
           <a:lstStyle/>
           <a:p>
             <a:r>
+              <a:rPr lang="de-CH" dirty="0" err="1" smtClean="0"/>
+              <a:t>Sequence</a:t>
+            </a:r>
+            <a:r>
               <a:rPr lang="de-CH" dirty="0" smtClean="0"/>
-              <a:t>CRC </a:t>
-            </a:r>
-            <a:r>
-              <a:rPr lang="de-CH" dirty="0"/>
-              <a:t>Card - </a:t>
-            </a:r>
-            <a:r>
-              <a:rPr lang="de-CH" dirty="0" err="1"/>
-              <a:t>ActivityRecord</a:t>
+              <a:t> </a:t>
+            </a:r>
+            <a:r>
+              <a:rPr lang="de-CH" dirty="0" err="1" smtClean="0"/>
+              <a:t>Diagram</a:t>
+            </a:r>
+            <a:r>
+              <a:rPr lang="de-CH" dirty="0" smtClean="0"/>
+              <a:t> – Alert </a:t>
+            </a:r>
+            <a:r>
+              <a:rPr lang="de-CH" dirty="0" err="1" smtClean="0"/>
+              <a:t>Danger</a:t>
+            </a:r>
+            <a:r>
+              <a:rPr lang="de-CH" dirty="0" smtClean="0"/>
+              <a:t> Notes</a:t>
             </a:r>
             <a:endParaRPr lang="de-CH" dirty="0"/>
           </a:p>
         </p:txBody>
       </p:sp>
+      <p:pic>
+        <p:nvPicPr>
+          <p:cNvPr id="4" name="Grafik 3"/>
+          <p:cNvPicPr>
+            <a:picLocks noChangeAspect="1"/>
+          </p:cNvPicPr>
+          <p:nvPr/>
+        </p:nvPicPr>
+        <p:blipFill rotWithShape="1">
+          <a:blip r:embed="rId2">
+            <a:extLst>
+              <a:ext uri="{28A0092B-C50C-407E-A947-70E740481C1C}">
+                <a14:useLocalDpi xmlns:a14="http://schemas.microsoft.com/office/drawing/2010/main" val="0"/>
+              </a:ext>
+            </a:extLst>
+          </a:blip>
+          <a:srcRect t="12936" b="13931"/>
+          <a:stretch/>
+        </p:blipFill>
+        <p:spPr>
+          <a:xfrm>
+            <a:off x="2430873" y="900000"/>
+            <a:ext cx="7177587" cy="5249156"/>
+          </a:xfrm>
+          <a:prstGeom prst="rect">
+            <a:avLst/>
+          </a:prstGeom>
+        </p:spPr>
+      </p:pic>
     </p:spTree>
     <p:extLst>
       <p:ext uri="{BB962C8B-B14F-4D97-AF65-F5344CB8AC3E}">
-        <p14:creationId xmlns:p14="http://schemas.microsoft.com/office/powerpoint/2010/main" val="1465781760"/>
+        <p14:creationId xmlns:p14="http://schemas.microsoft.com/office/powerpoint/2010/main" val="1312568616"/>
       </p:ext>
     </p:extLst>
   </p:cSld>

</xml_diff>

<commit_message>
corrected sequence diagram alertDangerNote
</commit_message>
<xml_diff>
--- a/CaseStudies/CaseStudy2/doc/02-DomainModelAndSequenceDiagram/Task_2_Presentation.pptx
+++ b/CaseStudies/CaseStudy2/doc/02-DomainModelAndSequenceDiagram/Task_2_Presentation.pptx
@@ -146,7 +146,7 @@
   </p:defaultTextStyle>
   <p:extLst>
     <p:ext uri="{EFAFB233-063F-42B5-8137-9DF3F51BA10A}">
-      <p15:sldGuideLst xmlns:p15="http://schemas.microsoft.com/office/powerpoint/2012/main">
+      <p15:sldGuideLst xmlns:p15="http://schemas.microsoft.com/office/powerpoint/2012/main" xmlns="">
         <p15:guide id="1" orient="horz" pos="2160">
           <p15:clr>
             <a:srgbClr val="A4A3A4"/>
@@ -254,7 +254,7 @@
               <a:pPr>
                 <a:defRPr/>
               </a:pPr>
-              <a:t>16.11.17</a:t>
+              <a:t>16.11.2017</a:t>
             </a:fld>
             <a:endParaRPr lang="de-CH" dirty="0"/>
           </a:p>
@@ -423,7 +423,7 @@
               <a:pPr>
                 <a:defRPr/>
               </a:pPr>
-              <a:t>‹#›</a:t>
+              <a:t>‹Nr.›</a:t>
             </a:fld>
             <a:endParaRPr lang="de-CH" dirty="0"/>
           </a:p>
@@ -1190,7 +1190,7 @@
               <a:pPr>
                 <a:defRPr/>
               </a:pPr>
-              <a:t>16.11.17</a:t>
+              <a:t>16.11.2017</a:t>
             </a:fld>
             <a:r>
               <a:rPr lang="de-DE" sz="1000" dirty="0"/>
@@ -1918,7 +1918,7 @@
               <a:pPr>
                 <a:defRPr/>
               </a:pPr>
-              <a:t>‹#›</a:t>
+              <a:t>‹Nr.›</a:t>
             </a:fld>
             <a:endParaRPr lang="de-CH" dirty="0"/>
           </a:p>
@@ -1981,7 +1981,7 @@
               <a:pPr>
                 <a:defRPr/>
               </a:pPr>
-              <a:t>‹#›</a:t>
+              <a:t>‹Nr.›</a:t>
             </a:fld>
             <a:endParaRPr lang="de-CH" dirty="0"/>
           </a:p>
@@ -2627,7 +2627,7 @@
               <a:pPr>
                 <a:defRPr/>
               </a:pPr>
-              <a:t>16.11.17</a:t>
+              <a:t>16.11.2017</a:t>
             </a:fld>
             <a:r>
               <a:rPr lang="de-DE" sz="1000" dirty="0"/>
@@ -3032,7 +3032,7 @@
               <a:pPr>
                 <a:defRPr/>
               </a:pPr>
-              <a:t>‹#›</a:t>
+              <a:t>‹Nr.›</a:t>
             </a:fld>
             <a:endParaRPr lang="de-CH" dirty="0"/>
           </a:p>
@@ -3431,7 +3431,7 @@
               <a:pPr>
                 <a:defRPr/>
               </a:pPr>
-              <a:t>‹#›</a:t>
+              <a:t>‹Nr.›</a:t>
             </a:fld>
             <a:endParaRPr lang="de-CH" dirty="0"/>
           </a:p>
@@ -3668,7 +3668,7 @@
               <a:pPr>
                 <a:defRPr/>
               </a:pPr>
-              <a:t>‹#›</a:t>
+              <a:t>‹Nr.›</a:t>
             </a:fld>
             <a:endParaRPr lang="de-CH" dirty="0"/>
           </a:p>
@@ -3979,7 +3979,7 @@
               <a:pPr>
                 <a:defRPr/>
               </a:pPr>
-              <a:t>‹#›</a:t>
+              <a:t>‹Nr.›</a:t>
             </a:fld>
             <a:endParaRPr lang="de-CH" dirty="0"/>
           </a:p>
@@ -4512,7 +4512,7 @@
               <a:pPr>
                 <a:defRPr/>
               </a:pPr>
-              <a:t>‹#›</a:t>
+              <a:t>‹Nr.›</a:t>
             </a:fld>
             <a:endParaRPr lang="de-CH" dirty="0"/>
           </a:p>
@@ -5045,7 +5045,7 @@
               <a:pPr>
                 <a:defRPr/>
               </a:pPr>
-              <a:t>‹#›</a:t>
+              <a:t>‹Nr.›</a:t>
             </a:fld>
             <a:endParaRPr lang="de-CH" dirty="0"/>
           </a:p>
@@ -5770,7 +5770,7 @@
               <a:pPr>
                 <a:defRPr/>
               </a:pPr>
-              <a:t>‹#›</a:t>
+              <a:t>‹Nr.›</a:t>
             </a:fld>
             <a:endParaRPr lang="de-CH" dirty="0"/>
           </a:p>
@@ -6076,7 +6076,7 @@
               <a:pPr>
                 <a:defRPr/>
               </a:pPr>
-              <a:t>‹#›</a:t>
+              <a:t>‹Nr.›</a:t>
             </a:fld>
             <a:endParaRPr lang="de-CH" dirty="0"/>
           </a:p>
@@ -8005,7 +8005,7 @@
       </p:sp>
       <p:pic>
         <p:nvPicPr>
-          <p:cNvPr id="4" name="Grafik 3"/>
+          <p:cNvPr id="5" name="Grafik 4"/>
           <p:cNvPicPr>
             <a:picLocks noChangeAspect="1"/>
           </p:cNvPicPr>
@@ -8019,13 +8019,13 @@
               </a:ext>
             </a:extLst>
           </a:blip>
-          <a:srcRect t="12936" b="13931"/>
+          <a:srcRect t="13285" b="12772"/>
           <a:stretch/>
         </p:blipFill>
         <p:spPr>
           <a:xfrm>
-            <a:off x="2430873" y="900000"/>
-            <a:ext cx="7177587" cy="5249156"/>
+            <a:off x="2396217" y="1190307"/>
+            <a:ext cx="7006863" cy="5181110"/>
           </a:xfrm>
           <a:prstGeom prst="rect">
             <a:avLst/>
@@ -8877,19 +8877,12 @@
 </file>
 
 <file path=customXml/item1.xml><?xml version="1.0" encoding="utf-8"?>
-<p:properties xmlns:p="http://schemas.microsoft.com/office/2006/metadata/properties" xmlns:xsi="http://www.w3.org/2001/XMLSchema-instance" xmlns:pc="http://schemas.microsoft.com/office/infopath/2007/PartnerControls">
-  <documentManagement>
-    <QMPilot_DokID xmlns="2551ef7e-3b29-44d1-a8ad-ef34c26bfc60">470</QMPilot_DokID>
-    <BfhIntranetDepartmentText xmlns="f6f68f68-5570-446d-b1e6-2310e70d83d3">
-      <Terms xmlns="http://schemas.microsoft.com/office/infopath/2007/PartnerControls">
-        <TermInfo xmlns="http://schemas.microsoft.com/office/infopath/2007/PartnerControls">
-          <TermName xmlns="http://schemas.microsoft.com/office/infopath/2007/PartnerControls">Vorlage</TermName>
-          <TermId xmlns="http://schemas.microsoft.com/office/infopath/2007/PartnerControls">de1a6d3c-ac6a-4b34-8edd-308eb81066db</TermId>
-        </TermInfo>
-      </Terms>
-    </BfhIntranetDepartmentText>
-  </documentManagement>
-</p:properties>
+<?mso-contentType ?>
+<FormTemplates xmlns="http://schemas.microsoft.com/sharepoint/v3/contenttype/forms">
+  <Display>DocumentLibraryForm</Display>
+  <Edit>DocumentLibraryForm</Edit>
+  <New>DocumentLibraryForm</New>
+</FormTemplates>
 </file>
 
 <file path=customXml/item2.xml><?xml version="1.0" encoding="utf-8"?>
@@ -9032,21 +9025,25 @@
 </file>
 
 <file path=customXml/item3.xml><?xml version="1.0" encoding="utf-8"?>
-<?mso-contentType ?>
-<FormTemplates xmlns="http://schemas.microsoft.com/sharepoint/v3/contenttype/forms">
-  <Display>DocumentLibraryForm</Display>
-  <Edit>DocumentLibraryForm</Edit>
-  <New>DocumentLibraryForm</New>
-</FormTemplates>
+<p:properties xmlns:p="http://schemas.microsoft.com/office/2006/metadata/properties" xmlns:xsi="http://www.w3.org/2001/XMLSchema-instance" xmlns:pc="http://schemas.microsoft.com/office/infopath/2007/PartnerControls">
+  <documentManagement>
+    <QMPilot_DokID xmlns="2551ef7e-3b29-44d1-a8ad-ef34c26bfc60">470</QMPilot_DokID>
+    <BfhIntranetDepartmentText xmlns="f6f68f68-5570-446d-b1e6-2310e70d83d3">
+      <Terms xmlns="http://schemas.microsoft.com/office/infopath/2007/PartnerControls">
+        <TermInfo xmlns="http://schemas.microsoft.com/office/infopath/2007/PartnerControls">
+          <TermName xmlns="http://schemas.microsoft.com/office/infopath/2007/PartnerControls">Vorlage</TermName>
+          <TermId xmlns="http://schemas.microsoft.com/office/infopath/2007/PartnerControls">de1a6d3c-ac6a-4b34-8edd-308eb81066db</TermId>
+        </TermInfo>
+      </Terms>
+    </BfhIntranetDepartmentText>
+  </documentManagement>
+</p:properties>
 </file>
 
 <file path=customXml/itemProps1.xml><?xml version="1.0" encoding="utf-8"?>
-<ds:datastoreItem xmlns:ds="http://schemas.openxmlformats.org/officeDocument/2006/customXml" ds:itemID="{A0E21803-70F9-41A8-9C11-39A2457CDDF7}">
+<ds:datastoreItem xmlns:ds="http://schemas.openxmlformats.org/officeDocument/2006/customXml" ds:itemID="{9D47BE21-B709-4D16-ABB2-11D40677E528}">
   <ds:schemaRefs>
-    <ds:schemaRef ds:uri="http://schemas.microsoft.com/office/2006/metadata/properties"/>
-    <ds:schemaRef ds:uri="http://schemas.microsoft.com/office/infopath/2007/PartnerControls"/>
-    <ds:schemaRef ds:uri="2551ef7e-3b29-44d1-a8ad-ef34c26bfc60"/>
-    <ds:schemaRef ds:uri="f6f68f68-5570-446d-b1e6-2310e70d83d3"/>
+    <ds:schemaRef ds:uri="http://schemas.microsoft.com/sharepoint/v3/contenttype/forms"/>
   </ds:schemaRefs>
 </ds:datastoreItem>
 </file>
@@ -9071,9 +9068,12 @@
 </file>
 
 <file path=customXml/itemProps3.xml><?xml version="1.0" encoding="utf-8"?>
-<ds:datastoreItem xmlns:ds="http://schemas.openxmlformats.org/officeDocument/2006/customXml" ds:itemID="{9D47BE21-B709-4D16-ABB2-11D40677E528}">
+<ds:datastoreItem xmlns:ds="http://schemas.openxmlformats.org/officeDocument/2006/customXml" ds:itemID="{A0E21803-70F9-41A8-9C11-39A2457CDDF7}">
   <ds:schemaRefs>
-    <ds:schemaRef ds:uri="http://schemas.microsoft.com/sharepoint/v3/contenttype/forms"/>
+    <ds:schemaRef ds:uri="http://schemas.microsoft.com/office/2006/metadata/properties"/>
+    <ds:schemaRef ds:uri="http://schemas.microsoft.com/office/infopath/2007/PartnerControls"/>
+    <ds:schemaRef ds:uri="2551ef7e-3b29-44d1-a8ad-ef34c26bfc60"/>
+    <ds:schemaRef ds:uri="f6f68f68-5570-446d-b1e6-2310e70d83d3"/>
   </ds:schemaRefs>
 </ds:datastoreItem>
 </file>
</xml_diff>

<commit_message>
update svnignore in VaadinProjects
</commit_message>
<xml_diff>
--- a/CaseStudies/CaseStudy2/doc/02-DomainModelAndSequenceDiagram/Task_2_Presentation.pptx
+++ b/CaseStudies/CaseStudy2/doc/02-DomainModelAndSequenceDiagram/Task_2_Presentation.pptx
@@ -146,7 +146,7 @@
   </p:defaultTextStyle>
   <p:extLst>
     <p:ext uri="{EFAFB233-063F-42B5-8137-9DF3F51BA10A}">
-      <p15:sldGuideLst xmlns:p15="http://schemas.microsoft.com/office/powerpoint/2012/main" xmlns="">
+      <p15:sldGuideLst xmlns:p15="http://schemas.microsoft.com/office/powerpoint/2012/main">
         <p15:guide id="1" orient="horz" pos="2160">
           <p15:clr>
             <a:srgbClr val="A4A3A4"/>
@@ -254,7 +254,7 @@
               <a:pPr>
                 <a:defRPr/>
               </a:pPr>
-              <a:t>16.11.2017</a:t>
+              <a:t>16.11.17</a:t>
             </a:fld>
             <a:endParaRPr lang="de-CH" dirty="0"/>
           </a:p>
@@ -423,7 +423,7 @@
               <a:pPr>
                 <a:defRPr/>
               </a:pPr>
-              <a:t>‹Nr.›</a:t>
+              <a:t>‹#›</a:t>
             </a:fld>
             <a:endParaRPr lang="de-CH" dirty="0"/>
           </a:p>
@@ -1190,7 +1190,7 @@
               <a:pPr>
                 <a:defRPr/>
               </a:pPr>
-              <a:t>16.11.2017</a:t>
+              <a:t>16.11.17</a:t>
             </a:fld>
             <a:r>
               <a:rPr lang="de-DE" sz="1000" dirty="0"/>
@@ -1918,7 +1918,7 @@
               <a:pPr>
                 <a:defRPr/>
               </a:pPr>
-              <a:t>‹Nr.›</a:t>
+              <a:t>‹#›</a:t>
             </a:fld>
             <a:endParaRPr lang="de-CH" dirty="0"/>
           </a:p>
@@ -1981,7 +1981,7 @@
               <a:pPr>
                 <a:defRPr/>
               </a:pPr>
-              <a:t>‹Nr.›</a:t>
+              <a:t>‹#›</a:t>
             </a:fld>
             <a:endParaRPr lang="de-CH" dirty="0"/>
           </a:p>
@@ -2627,7 +2627,7 @@
               <a:pPr>
                 <a:defRPr/>
               </a:pPr>
-              <a:t>16.11.2017</a:t>
+              <a:t>16.11.17</a:t>
             </a:fld>
             <a:r>
               <a:rPr lang="de-DE" sz="1000" dirty="0"/>
@@ -3032,7 +3032,7 @@
               <a:pPr>
                 <a:defRPr/>
               </a:pPr>
-              <a:t>‹Nr.›</a:t>
+              <a:t>‹#›</a:t>
             </a:fld>
             <a:endParaRPr lang="de-CH" dirty="0"/>
           </a:p>
@@ -3431,7 +3431,7 @@
               <a:pPr>
                 <a:defRPr/>
               </a:pPr>
-              <a:t>‹Nr.›</a:t>
+              <a:t>‹#›</a:t>
             </a:fld>
             <a:endParaRPr lang="de-CH" dirty="0"/>
           </a:p>
@@ -3668,7 +3668,7 @@
               <a:pPr>
                 <a:defRPr/>
               </a:pPr>
-              <a:t>‹Nr.›</a:t>
+              <a:t>‹#›</a:t>
             </a:fld>
             <a:endParaRPr lang="de-CH" dirty="0"/>
           </a:p>
@@ -3979,7 +3979,7 @@
               <a:pPr>
                 <a:defRPr/>
               </a:pPr>
-              <a:t>‹Nr.›</a:t>
+              <a:t>‹#›</a:t>
             </a:fld>
             <a:endParaRPr lang="de-CH" dirty="0"/>
           </a:p>
@@ -4512,7 +4512,7 @@
               <a:pPr>
                 <a:defRPr/>
               </a:pPr>
-              <a:t>‹Nr.›</a:t>
+              <a:t>‹#›</a:t>
             </a:fld>
             <a:endParaRPr lang="de-CH" dirty="0"/>
           </a:p>
@@ -5045,7 +5045,7 @@
               <a:pPr>
                 <a:defRPr/>
               </a:pPr>
-              <a:t>‹Nr.›</a:t>
+              <a:t>‹#›</a:t>
             </a:fld>
             <a:endParaRPr lang="de-CH" dirty="0"/>
           </a:p>
@@ -5770,7 +5770,7 @@
               <a:pPr>
                 <a:defRPr/>
               </a:pPr>
-              <a:t>‹Nr.›</a:t>
+              <a:t>‹#›</a:t>
             </a:fld>
             <a:endParaRPr lang="de-CH" dirty="0"/>
           </a:p>
@@ -6076,7 +6076,7 @@
               <a:pPr>
                 <a:defRPr/>
               </a:pPr>
-              <a:t>‹Nr.›</a:t>
+              <a:t>‹#›</a:t>
             </a:fld>
             <a:endParaRPr lang="de-CH" dirty="0"/>
           </a:p>
@@ -8242,6 +8242,14 @@
             <a:r>
               <a:rPr lang="en-US" dirty="0" err="1" smtClean="0"/>
               <a:t>Fragen</a:t>
+            </a:r>
+            <a:r>
+              <a:rPr lang="en-US" dirty="0" smtClean="0"/>
+              <a:t> / </a:t>
+            </a:r>
+            <a:r>
+              <a:rPr lang="en-US" dirty="0" err="1" smtClean="0"/>
+              <a:t>Anmerkungen</a:t>
             </a:r>
             <a:r>
               <a:rPr lang="en-US" dirty="0" smtClean="0"/>

</xml_diff>